<commit_message>
Boy j'ai rajouté le backlog dans le ppt et la liste des principales pages de l'App dans le doc.
</commit_message>
<xml_diff>
--- a/useCase_ppt.pptx
+++ b/useCase_ppt.pptx
@@ -5,7 +5,7 @@
     <p:sldMasterId id="2147483648" r:id="rId1"/>
   </p:sldMasterIdLst>
   <p:notesMasterIdLst>
-    <p:notesMasterId r:id="rId9"/>
+    <p:notesMasterId r:id="rId11"/>
   </p:notesMasterIdLst>
   <p:sldIdLst>
     <p:sldId id="256" r:id="rId2"/>
@@ -13,8 +13,10 @@
     <p:sldId id="258" r:id="rId4"/>
     <p:sldId id="259" r:id="rId5"/>
     <p:sldId id="260" r:id="rId6"/>
-    <p:sldId id="261" r:id="rId7"/>
-    <p:sldId id="262" r:id="rId8"/>
+    <p:sldId id="263" r:id="rId7"/>
+    <p:sldId id="266" r:id="rId8"/>
+    <p:sldId id="261" r:id="rId9"/>
+    <p:sldId id="262" r:id="rId10"/>
   </p:sldIdLst>
   <p:sldSz cx="9144000" cy="6858000" type="screen4x3"/>
   <p:notesSz cx="6858000" cy="9144000"/>
@@ -198,7 +200,8 @@
           <a:p>
             <a:fld id="{2F10F2CC-E386-4983-90C0-D73DD7D6C160}" type="datetimeFigureOut">
               <a:rPr lang="fr-FR" smtClean="0"/>
-              <a:t>20/07/2018</a:t>
+              <a:pPr/>
+              <a:t>02/08/2018</a:t>
             </a:fld>
             <a:endParaRPr lang="fr-FR"/>
           </a:p>
@@ -359,6 +362,7 @@
           <a:p>
             <a:fld id="{35FA45C5-107C-42BC-894C-826F07522092}" type="slidenum">
               <a:rPr lang="fr-FR" smtClean="0"/>
+              <a:pPr/>
               <a:t>‹N°›</a:t>
             </a:fld>
             <a:endParaRPr lang="fr-FR"/>
@@ -530,6 +534,7 @@
           <a:p>
             <a:fld id="{35FA45C5-107C-42BC-894C-826F07522092}" type="slidenum">
               <a:rPr lang="fr-FR" smtClean="0"/>
+              <a:pPr/>
               <a:t>1</a:t>
             </a:fld>
             <a:endParaRPr lang="fr-FR"/>
@@ -611,6 +616,7 @@
           <a:p>
             <a:fld id="{35FA45C5-107C-42BC-894C-826F07522092}" type="slidenum">
               <a:rPr lang="fr-FR" smtClean="0"/>
+              <a:pPr/>
               <a:t>2</a:t>
             </a:fld>
             <a:endParaRPr lang="fr-FR"/>
@@ -692,6 +698,7 @@
           <a:p>
             <a:fld id="{35FA45C5-107C-42BC-894C-826F07522092}" type="slidenum">
               <a:rPr lang="fr-FR" smtClean="0"/>
+              <a:pPr/>
               <a:t>3</a:t>
             </a:fld>
             <a:endParaRPr lang="fr-FR"/>
@@ -773,6 +780,7 @@
           <a:p>
             <a:fld id="{35FA45C5-107C-42BC-894C-826F07522092}" type="slidenum">
               <a:rPr lang="fr-FR" smtClean="0"/>
+              <a:pPr/>
               <a:t>4</a:t>
             </a:fld>
             <a:endParaRPr lang="fr-FR"/>
@@ -854,6 +862,7 @@
           <a:p>
             <a:fld id="{35FA45C5-107C-42BC-894C-826F07522092}" type="slidenum">
               <a:rPr lang="fr-FR" smtClean="0"/>
+              <a:pPr/>
               <a:t>5</a:t>
             </a:fld>
             <a:endParaRPr lang="fr-FR"/>
@@ -935,6 +944,7 @@
           <a:p>
             <a:fld id="{35FA45C5-107C-42BC-894C-826F07522092}" type="slidenum">
               <a:rPr lang="fr-FR" smtClean="0"/>
+              <a:pPr/>
               <a:t>6</a:t>
             </a:fld>
             <a:endParaRPr lang="fr-FR"/>
@@ -1016,7 +1026,172 @@
           <a:p>
             <a:fld id="{35FA45C5-107C-42BC-894C-826F07522092}" type="slidenum">
               <a:rPr lang="fr-FR" smtClean="0"/>
+              <a:pPr/>
               <a:t>7</a:t>
+            </a:fld>
+            <a:endParaRPr lang="fr-FR"/>
+          </a:p>
+        </p:txBody>
+      </p:sp>
+    </p:spTree>
+  </p:cSld>
+  <p:clrMapOvr>
+    <a:masterClrMapping/>
+  </p:clrMapOvr>
+</p:notes>
+</file>
+
+<file path=ppt/notesSlides/notesSlide8.xml><?xml version="1.0" encoding="utf-8"?>
+<p:notes xmlns:a="http://schemas.openxmlformats.org/drawingml/2006/main" xmlns:r="http://schemas.openxmlformats.org/officeDocument/2006/relationships" xmlns:p="http://schemas.openxmlformats.org/presentationml/2006/main">
+  <p:cSld>
+    <p:spTree>
+      <p:nvGrpSpPr>
+        <p:cNvPr id="1" name=""/>
+        <p:cNvGrpSpPr/>
+        <p:nvPr/>
+      </p:nvGrpSpPr>
+      <p:grpSpPr>
+        <a:xfrm>
+          <a:off x="0" y="0"/>
+          <a:ext cx="0" cy="0"/>
+          <a:chOff x="0" y="0"/>
+          <a:chExt cx="0" cy="0"/>
+        </a:xfrm>
+      </p:grpSpPr>
+      <p:sp>
+        <p:nvSpPr>
+          <p:cNvPr id="2" name="Espace réservé de l'image des diapositives 1"/>
+          <p:cNvSpPr>
+            <a:spLocks noGrp="1" noRot="1" noChangeAspect="1"/>
+          </p:cNvSpPr>
+          <p:nvPr>
+            <p:ph type="sldImg"/>
+          </p:nvPr>
+        </p:nvSpPr>
+        <p:spPr/>
+      </p:sp>
+      <p:sp>
+        <p:nvSpPr>
+          <p:cNvPr id="3" name="Espace réservé des commentaires 2"/>
+          <p:cNvSpPr>
+            <a:spLocks noGrp="1"/>
+          </p:cNvSpPr>
+          <p:nvPr>
+            <p:ph type="body" idx="1"/>
+          </p:nvPr>
+        </p:nvSpPr>
+        <p:spPr/>
+        <p:txBody>
+          <a:bodyPr>
+            <a:normAutofit/>
+          </a:bodyPr>
+          <a:lstStyle/>
+          <a:p>
+            <a:endParaRPr lang="fr-FR" dirty="0"/>
+          </a:p>
+        </p:txBody>
+      </p:sp>
+      <p:sp>
+        <p:nvSpPr>
+          <p:cNvPr id="4" name="Espace réservé du numéro de diapositive 3"/>
+          <p:cNvSpPr>
+            <a:spLocks noGrp="1"/>
+          </p:cNvSpPr>
+          <p:nvPr>
+            <p:ph type="sldNum" sz="quarter" idx="10"/>
+          </p:nvPr>
+        </p:nvSpPr>
+        <p:spPr/>
+        <p:txBody>
+          <a:bodyPr/>
+          <a:lstStyle/>
+          <a:p>
+            <a:fld id="{35FA45C5-107C-42BC-894C-826F07522092}" type="slidenum">
+              <a:rPr lang="fr-FR" smtClean="0"/>
+              <a:pPr/>
+              <a:t>8</a:t>
+            </a:fld>
+            <a:endParaRPr lang="fr-FR"/>
+          </a:p>
+        </p:txBody>
+      </p:sp>
+    </p:spTree>
+  </p:cSld>
+  <p:clrMapOvr>
+    <a:masterClrMapping/>
+  </p:clrMapOvr>
+</p:notes>
+</file>
+
+<file path=ppt/notesSlides/notesSlide9.xml><?xml version="1.0" encoding="utf-8"?>
+<p:notes xmlns:a="http://schemas.openxmlformats.org/drawingml/2006/main" xmlns:r="http://schemas.openxmlformats.org/officeDocument/2006/relationships" xmlns:p="http://schemas.openxmlformats.org/presentationml/2006/main">
+  <p:cSld>
+    <p:spTree>
+      <p:nvGrpSpPr>
+        <p:cNvPr id="1" name=""/>
+        <p:cNvGrpSpPr/>
+        <p:nvPr/>
+      </p:nvGrpSpPr>
+      <p:grpSpPr>
+        <a:xfrm>
+          <a:off x="0" y="0"/>
+          <a:ext cx="0" cy="0"/>
+          <a:chOff x="0" y="0"/>
+          <a:chExt cx="0" cy="0"/>
+        </a:xfrm>
+      </p:grpSpPr>
+      <p:sp>
+        <p:nvSpPr>
+          <p:cNvPr id="2" name="Espace réservé de l'image des diapositives 1"/>
+          <p:cNvSpPr>
+            <a:spLocks noGrp="1" noRot="1" noChangeAspect="1"/>
+          </p:cNvSpPr>
+          <p:nvPr>
+            <p:ph type="sldImg"/>
+          </p:nvPr>
+        </p:nvSpPr>
+        <p:spPr/>
+      </p:sp>
+      <p:sp>
+        <p:nvSpPr>
+          <p:cNvPr id="3" name="Espace réservé des commentaires 2"/>
+          <p:cNvSpPr>
+            <a:spLocks noGrp="1"/>
+          </p:cNvSpPr>
+          <p:nvPr>
+            <p:ph type="body" idx="1"/>
+          </p:nvPr>
+        </p:nvSpPr>
+        <p:spPr/>
+        <p:txBody>
+          <a:bodyPr>
+            <a:normAutofit/>
+          </a:bodyPr>
+          <a:lstStyle/>
+          <a:p>
+            <a:endParaRPr lang="fr-FR" dirty="0"/>
+          </a:p>
+        </p:txBody>
+      </p:sp>
+      <p:sp>
+        <p:nvSpPr>
+          <p:cNvPr id="4" name="Espace réservé du numéro de diapositive 3"/>
+          <p:cNvSpPr>
+            <a:spLocks noGrp="1"/>
+          </p:cNvSpPr>
+          <p:nvPr>
+            <p:ph type="sldNum" sz="quarter" idx="10"/>
+          </p:nvPr>
+        </p:nvSpPr>
+        <p:spPr/>
+        <p:txBody>
+          <a:bodyPr/>
+          <a:lstStyle/>
+          <a:p>
+            <a:fld id="{35FA45C5-107C-42BC-894C-826F07522092}" type="slidenum">
+              <a:rPr lang="fr-FR" smtClean="0"/>
+              <a:pPr/>
+              <a:t>9</a:t>
             </a:fld>
             <a:endParaRPr lang="fr-FR"/>
           </a:p>
@@ -1211,7 +1386,8 @@
           <a:p>
             <a:fld id="{FE158ADE-8714-4F5E-A38B-205E88FD131D}" type="datetimeFigureOut">
               <a:rPr lang="fr-FR" smtClean="0"/>
-              <a:t>20/07/2018</a:t>
+              <a:pPr/>
+              <a:t>02/08/2018</a:t>
             </a:fld>
             <a:endParaRPr lang="fr-FR"/>
           </a:p>
@@ -1253,6 +1429,7 @@
           <a:p>
             <a:fld id="{E6EAA892-4601-49B8-A101-37912D734FE4}" type="slidenum">
               <a:rPr lang="fr-FR" smtClean="0"/>
+              <a:pPr/>
               <a:t>‹N°›</a:t>
             </a:fld>
             <a:endParaRPr lang="fr-FR"/>
@@ -1376,7 +1553,8 @@
           <a:p>
             <a:fld id="{FE158ADE-8714-4F5E-A38B-205E88FD131D}" type="datetimeFigureOut">
               <a:rPr lang="fr-FR" smtClean="0"/>
-              <a:t>20/07/2018</a:t>
+              <a:pPr/>
+              <a:t>02/08/2018</a:t>
             </a:fld>
             <a:endParaRPr lang="fr-FR"/>
           </a:p>
@@ -1418,6 +1596,7 @@
           <a:p>
             <a:fld id="{E6EAA892-4601-49B8-A101-37912D734FE4}" type="slidenum">
               <a:rPr lang="fr-FR" smtClean="0"/>
+              <a:pPr/>
               <a:t>‹N°›</a:t>
             </a:fld>
             <a:endParaRPr lang="fr-FR"/>
@@ -1551,7 +1730,8 @@
           <a:p>
             <a:fld id="{FE158ADE-8714-4F5E-A38B-205E88FD131D}" type="datetimeFigureOut">
               <a:rPr lang="fr-FR" smtClean="0"/>
-              <a:t>20/07/2018</a:t>
+              <a:pPr/>
+              <a:t>02/08/2018</a:t>
             </a:fld>
             <a:endParaRPr lang="fr-FR"/>
           </a:p>
@@ -1593,6 +1773,7 @@
           <a:p>
             <a:fld id="{E6EAA892-4601-49B8-A101-37912D734FE4}" type="slidenum">
               <a:rPr lang="fr-FR" smtClean="0"/>
+              <a:pPr/>
               <a:t>‹N°›</a:t>
             </a:fld>
             <a:endParaRPr lang="fr-FR"/>
@@ -1716,7 +1897,8 @@
           <a:p>
             <a:fld id="{FE158ADE-8714-4F5E-A38B-205E88FD131D}" type="datetimeFigureOut">
               <a:rPr lang="fr-FR" smtClean="0"/>
-              <a:t>20/07/2018</a:t>
+              <a:pPr/>
+              <a:t>02/08/2018</a:t>
             </a:fld>
             <a:endParaRPr lang="fr-FR"/>
           </a:p>
@@ -1758,6 +1940,7 @@
           <a:p>
             <a:fld id="{E6EAA892-4601-49B8-A101-37912D734FE4}" type="slidenum">
               <a:rPr lang="fr-FR" smtClean="0"/>
+              <a:pPr/>
               <a:t>‹N°›</a:t>
             </a:fld>
             <a:endParaRPr lang="fr-FR"/>
@@ -1957,7 +2140,8 @@
           <a:p>
             <a:fld id="{FE158ADE-8714-4F5E-A38B-205E88FD131D}" type="datetimeFigureOut">
               <a:rPr lang="fr-FR" smtClean="0"/>
-              <a:t>20/07/2018</a:t>
+              <a:pPr/>
+              <a:t>02/08/2018</a:t>
             </a:fld>
             <a:endParaRPr lang="fr-FR"/>
           </a:p>
@@ -1999,6 +2183,7 @@
           <a:p>
             <a:fld id="{E6EAA892-4601-49B8-A101-37912D734FE4}" type="slidenum">
               <a:rPr lang="fr-FR" smtClean="0"/>
+              <a:pPr/>
               <a:t>‹N°›</a:t>
             </a:fld>
             <a:endParaRPr lang="fr-FR"/>
@@ -2240,7 +2425,8 @@
           <a:p>
             <a:fld id="{FE158ADE-8714-4F5E-A38B-205E88FD131D}" type="datetimeFigureOut">
               <a:rPr lang="fr-FR" smtClean="0"/>
-              <a:t>20/07/2018</a:t>
+              <a:pPr/>
+              <a:t>02/08/2018</a:t>
             </a:fld>
             <a:endParaRPr lang="fr-FR"/>
           </a:p>
@@ -2282,6 +2468,7 @@
           <a:p>
             <a:fld id="{E6EAA892-4601-49B8-A101-37912D734FE4}" type="slidenum">
               <a:rPr lang="fr-FR" smtClean="0"/>
+              <a:pPr/>
               <a:t>‹N°›</a:t>
             </a:fld>
             <a:endParaRPr lang="fr-FR"/>
@@ -2657,7 +2844,8 @@
           <a:p>
             <a:fld id="{FE158ADE-8714-4F5E-A38B-205E88FD131D}" type="datetimeFigureOut">
               <a:rPr lang="fr-FR" smtClean="0"/>
-              <a:t>20/07/2018</a:t>
+              <a:pPr/>
+              <a:t>02/08/2018</a:t>
             </a:fld>
             <a:endParaRPr lang="fr-FR"/>
           </a:p>
@@ -2699,6 +2887,7 @@
           <a:p>
             <a:fld id="{E6EAA892-4601-49B8-A101-37912D734FE4}" type="slidenum">
               <a:rPr lang="fr-FR" smtClean="0"/>
+              <a:pPr/>
               <a:t>‹N°›</a:t>
             </a:fld>
             <a:endParaRPr lang="fr-FR"/>
@@ -2770,7 +2959,8 @@
           <a:p>
             <a:fld id="{FE158ADE-8714-4F5E-A38B-205E88FD131D}" type="datetimeFigureOut">
               <a:rPr lang="fr-FR" smtClean="0"/>
-              <a:t>20/07/2018</a:t>
+              <a:pPr/>
+              <a:t>02/08/2018</a:t>
             </a:fld>
             <a:endParaRPr lang="fr-FR"/>
           </a:p>
@@ -2812,6 +3002,7 @@
           <a:p>
             <a:fld id="{E6EAA892-4601-49B8-A101-37912D734FE4}" type="slidenum">
               <a:rPr lang="fr-FR" smtClean="0"/>
+              <a:pPr/>
               <a:t>‹N°›</a:t>
             </a:fld>
             <a:endParaRPr lang="fr-FR"/>
@@ -2860,7 +3051,8 @@
           <a:p>
             <a:fld id="{FE158ADE-8714-4F5E-A38B-205E88FD131D}" type="datetimeFigureOut">
               <a:rPr lang="fr-FR" smtClean="0"/>
-              <a:t>20/07/2018</a:t>
+              <a:pPr/>
+              <a:t>02/08/2018</a:t>
             </a:fld>
             <a:endParaRPr lang="fr-FR"/>
           </a:p>
@@ -2902,6 +3094,7 @@
           <a:p>
             <a:fld id="{E6EAA892-4601-49B8-A101-37912D734FE4}" type="slidenum">
               <a:rPr lang="fr-FR" smtClean="0"/>
+              <a:pPr/>
               <a:t>‹N°›</a:t>
             </a:fld>
             <a:endParaRPr lang="fr-FR"/>
@@ -3132,7 +3325,8 @@
           <a:p>
             <a:fld id="{FE158ADE-8714-4F5E-A38B-205E88FD131D}" type="datetimeFigureOut">
               <a:rPr lang="fr-FR" smtClean="0"/>
-              <a:t>20/07/2018</a:t>
+              <a:pPr/>
+              <a:t>02/08/2018</a:t>
             </a:fld>
             <a:endParaRPr lang="fr-FR"/>
           </a:p>
@@ -3174,6 +3368,7 @@
           <a:p>
             <a:fld id="{E6EAA892-4601-49B8-A101-37912D734FE4}" type="slidenum">
               <a:rPr lang="fr-FR" smtClean="0"/>
+              <a:pPr/>
               <a:t>‹N°›</a:t>
             </a:fld>
             <a:endParaRPr lang="fr-FR"/>
@@ -3380,7 +3575,8 @@
           <a:p>
             <a:fld id="{FE158ADE-8714-4F5E-A38B-205E88FD131D}" type="datetimeFigureOut">
               <a:rPr lang="fr-FR" smtClean="0"/>
-              <a:t>20/07/2018</a:t>
+              <a:pPr/>
+              <a:t>02/08/2018</a:t>
             </a:fld>
             <a:endParaRPr lang="fr-FR"/>
           </a:p>
@@ -3422,6 +3618,7 @@
           <a:p>
             <a:fld id="{E6EAA892-4601-49B8-A101-37912D734FE4}" type="slidenum">
               <a:rPr lang="fr-FR" smtClean="0"/>
+              <a:pPr/>
               <a:t>‹N°›</a:t>
             </a:fld>
             <a:endParaRPr lang="fr-FR"/>
@@ -3593,7 +3790,8 @@
           <a:p>
             <a:fld id="{FE158ADE-8714-4F5E-A38B-205E88FD131D}" type="datetimeFigureOut">
               <a:rPr lang="fr-FR" smtClean="0"/>
-              <a:t>20/07/2018</a:t>
+              <a:pPr/>
+              <a:t>02/08/2018</a:t>
             </a:fld>
             <a:endParaRPr lang="fr-FR"/>
           </a:p>
@@ -3671,6 +3869,7 @@
           <a:p>
             <a:fld id="{E6EAA892-4601-49B8-A101-37912D734FE4}" type="slidenum">
               <a:rPr lang="fr-FR" smtClean="0"/>
+              <a:pPr/>
               <a:t>‹N°›</a:t>
             </a:fld>
             <a:endParaRPr lang="fr-FR"/>
@@ -4174,11 +4373,6 @@
               </a:rPr>
               <a:t>Inscription</a:t>
             </a:r>
-            <a:endParaRPr lang="fr-FR" sz="1300" dirty="0" smtClean="0">
-              <a:solidFill>
-                <a:schemeClr val="tx1"/>
-              </a:solidFill>
-            </a:endParaRPr>
           </a:p>
           <a:p>
             <a:pPr algn="ctr"/>
@@ -4250,11 +4444,6 @@
               </a:rPr>
               <a:t>Connexion</a:t>
             </a:r>
-            <a:endParaRPr lang="fr-FR" sz="1300" dirty="0" smtClean="0">
-              <a:solidFill>
-                <a:schemeClr val="tx1"/>
-              </a:solidFill>
-            </a:endParaRPr>
           </a:p>
           <a:p>
             <a:pPr algn="ctr"/>
@@ -4498,11 +4687,6 @@
               </a:rPr>
               <a:t>Définition</a:t>
             </a:r>
-            <a:endParaRPr lang="fr-FR" sz="1300" dirty="0" smtClean="0">
-              <a:solidFill>
-                <a:schemeClr val="tx1"/>
-              </a:solidFill>
-            </a:endParaRPr>
           </a:p>
           <a:p>
             <a:pPr algn="ctr"/>
@@ -6411,11 +6595,6 @@
               </a:rPr>
               <a:t> PAC’s response</a:t>
             </a:r>
-            <a:endParaRPr lang="fr-FR" sz="1300" dirty="0" smtClean="0">
-              <a:solidFill>
-                <a:schemeClr val="tx1"/>
-              </a:solidFill>
-            </a:endParaRPr>
           </a:p>
         </p:txBody>
       </p:sp>
@@ -7449,7 +7628,6 @@
               <a:rPr lang="fr-FR" b="1" dirty="0"/>
               <a:t>B</a:t>
             </a:r>
-            <a:endParaRPr lang="fr-FR" b="1" dirty="0"/>
           </a:p>
         </p:txBody>
       </p:sp>
@@ -8885,7 +9063,6 @@
               <a:rPr lang="fr-FR" b="1" dirty="0"/>
               <a:t>B</a:t>
             </a:r>
-            <a:endParaRPr lang="fr-FR" b="1" dirty="0"/>
           </a:p>
         </p:txBody>
       </p:sp>
@@ -9368,8 +9545,13 @@
                   <a:schemeClr val="tx1"/>
                 </a:solidFill>
               </a:rPr>
-              <a:t>Appel</a:t>
-            </a:r>
+              <a:t>Appel/SMS</a:t>
+            </a:r>
+            <a:endParaRPr lang="fr-FR" sz="1300" dirty="0" smtClean="0">
+              <a:solidFill>
+                <a:schemeClr val="tx1"/>
+              </a:solidFill>
+            </a:endParaRPr>
           </a:p>
           <a:p>
             <a:pPr algn="ctr"/>
@@ -9441,7 +9623,6 @@
               <a:rPr lang="fr-FR" b="1" dirty="0"/>
               <a:t>D</a:t>
             </a:r>
-            <a:endParaRPr lang="fr-FR" b="1" dirty="0"/>
           </a:p>
         </p:txBody>
       </p:sp>
@@ -10630,8 +10811,13 @@
                   <a:schemeClr val="bg1"/>
                 </a:solidFill>
               </a:rPr>
-              <a:t>Exemple De Visuels</a:t>
-            </a:r>
+              <a:t>Le BackLog</a:t>
+            </a:r>
+            <a:endParaRPr lang="fr-FR" sz="2800" b="1" cap="small" dirty="0" smtClean="0">
+              <a:solidFill>
+                <a:schemeClr val="bg1"/>
+              </a:solidFill>
+            </a:endParaRPr>
           </a:p>
         </p:txBody>
       </p:sp>
@@ -10643,8 +10829,8 @@
         </p:nvSpPr>
         <p:spPr>
           <a:xfrm>
-            <a:off x="2411760" y="116632"/>
-            <a:ext cx="4392488" cy="6552728"/>
+            <a:off x="1115616" y="116632"/>
+            <a:ext cx="7848872" cy="6552728"/>
           </a:xfrm>
           <a:prstGeom prst="rect">
             <a:avLst/>
@@ -10686,7 +10872,15 @@
                   <a:schemeClr val="tx1"/>
                 </a:solidFill>
               </a:rPr>
-              <a:t>VIEW – 1 </a:t>
+              <a:t>CHART </a:t>
+            </a:r>
+            <a:r>
+              <a:rPr lang="fr-FR" sz="2800" b="1" dirty="0" smtClean="0">
+                <a:solidFill>
+                  <a:schemeClr val="tx1"/>
+                </a:solidFill>
+              </a:rPr>
+              <a:t>– 1 </a:t>
             </a:r>
           </a:p>
           <a:p>
@@ -10697,7 +10891,7 @@
                   <a:schemeClr val="tx1"/>
                 </a:solidFill>
               </a:rPr>
-              <a:t>Déclenchement rapide d’Alerte (Secouement du téléphone, double-click du bouton Home, etc.)</a:t>
+              <a:t>Ici sont listées les fonctionnalités par ordre de priorité (les plus importantes sont en haut).</a:t>
             </a:r>
             <a:endParaRPr lang="fr-FR" sz="1500" b="1" dirty="0">
               <a:solidFill>
@@ -10707,66 +10901,689 @@
           </a:p>
         </p:txBody>
       </p:sp>
-      <p:pic>
-        <p:nvPicPr>
-          <p:cNvPr id="2050" name="Picture 2"/>
-          <p:cNvPicPr>
-            <a:picLocks noChangeAspect="1" noChangeArrowheads="1"/>
-          </p:cNvPicPr>
-          <p:nvPr/>
-        </p:nvPicPr>
-        <p:blipFill>
-          <a:blip r:embed="rId3" cstate="print"/>
-          <a:srcRect/>
-          <a:stretch>
-            <a:fillRect/>
-          </a:stretch>
-        </p:blipFill>
-        <p:spPr bwMode="auto">
-          <a:xfrm>
-            <a:off x="3627384" y="2780928"/>
-            <a:ext cx="1592688" cy="3240360"/>
-          </a:xfrm>
-          <a:prstGeom prst="rect">
-            <a:avLst/>
-          </a:prstGeom>
-          <a:noFill/>
-          <a:ln w="9525">
-            <a:noFill/>
-            <a:miter lim="800000"/>
-            <a:headEnd/>
-            <a:tailEnd/>
-          </a:ln>
-          <a:effectLst/>
-        </p:spPr>
-      </p:pic>
-      <p:sp>
-        <p:nvSpPr>
-          <p:cNvPr id="23" name="Carré corné 22"/>
-          <p:cNvSpPr/>
-          <p:nvPr/>
-        </p:nvSpPr>
-        <p:spPr>
-          <a:xfrm>
-            <a:off x="3707904" y="1412776"/>
-            <a:ext cx="1440160" cy="576064"/>
-          </a:xfrm>
-          <a:prstGeom prst="foldedCorner">
-            <a:avLst/>
-          </a:prstGeom>
-          <a:solidFill>
-            <a:schemeClr val="accent5">
-              <a:lumMod val="40000"/>
-              <a:lumOff val="60000"/>
-            </a:schemeClr>
-          </a:solidFill>
+      <p:graphicFrame>
+        <p:nvGraphicFramePr>
+          <p:cNvPr id="8" name="Tableau 7"/>
+          <p:cNvGraphicFramePr>
+            <a:graphicFrameLocks noGrp="1"/>
+          </p:cNvGraphicFramePr>
+          <p:nvPr/>
+        </p:nvGraphicFramePr>
+        <p:xfrm>
+          <a:off x="1272476" y="1130005"/>
+          <a:ext cx="7620004" cy="5179315"/>
+        </p:xfrm>
+        <a:graphic>
+          <a:graphicData uri="http://schemas.openxmlformats.org/drawingml/2006/table">
+            <a:tbl>
+              <a:tblPr firstRow="1" bandRow="1">
+                <a:tableStyleId>{5C22544A-7EE6-4342-B048-85BDC9FD1C3A}</a:tableStyleId>
+              </a:tblPr>
+              <a:tblGrid>
+                <a:gridCol w="720080"/>
+                <a:gridCol w="2376264"/>
+                <a:gridCol w="1512168"/>
+                <a:gridCol w="1512169"/>
+                <a:gridCol w="1499323"/>
+              </a:tblGrid>
+              <a:tr h="605039">
+                <a:tc>
+                  <a:txBody>
+                    <a:bodyPr/>
+                    <a:lstStyle/>
+                    <a:p>
+                      <a:pPr algn="ctr"/>
+                      <a:r>
+                        <a:rPr lang="fr-FR" sz="1600" dirty="0" smtClean="0"/>
+                        <a:t>ID</a:t>
+                      </a:r>
+                      <a:endParaRPr lang="fr-FR" sz="1600" dirty="0"/>
+                    </a:p>
+                  </a:txBody>
+                  <a:tcPr marT="144000">
+                    <a:solidFill>
+                      <a:schemeClr val="tx2">
+                        <a:lumMod val="75000"/>
+                      </a:schemeClr>
+                    </a:solidFill>
+                  </a:tcPr>
+                </a:tc>
+                <a:tc>
+                  <a:txBody>
+                    <a:bodyPr/>
+                    <a:lstStyle/>
+                    <a:p>
+                      <a:pPr algn="ctr"/>
+                      <a:r>
+                        <a:rPr lang="fr-FR" sz="1600" dirty="0" smtClean="0"/>
+                        <a:t>Liste</a:t>
+                      </a:r>
+                      <a:endParaRPr lang="fr-FR" sz="1600" dirty="0"/>
+                    </a:p>
+                  </a:txBody>
+                  <a:tcPr marT="144000">
+                    <a:solidFill>
+                      <a:schemeClr val="tx2">
+                        <a:lumMod val="75000"/>
+                      </a:schemeClr>
+                    </a:solidFill>
+                  </a:tcPr>
+                </a:tc>
+                <a:tc>
+                  <a:txBody>
+                    <a:bodyPr/>
+                    <a:lstStyle/>
+                    <a:p>
+                      <a:pPr algn="ctr"/>
+                      <a:r>
+                        <a:rPr lang="fr-FR" sz="1600" dirty="0" smtClean="0"/>
+                        <a:t>En cours de Dév.</a:t>
+                      </a:r>
+                      <a:endParaRPr lang="fr-FR" sz="1600" dirty="0"/>
+                    </a:p>
+                  </a:txBody>
+                  <a:tcPr marT="144000">
+                    <a:solidFill>
+                      <a:schemeClr val="tx2">
+                        <a:lumMod val="75000"/>
+                      </a:schemeClr>
+                    </a:solidFill>
+                  </a:tcPr>
+                </a:tc>
+                <a:tc>
+                  <a:txBody>
+                    <a:bodyPr/>
+                    <a:lstStyle/>
+                    <a:p>
+                      <a:pPr algn="ctr"/>
+                      <a:r>
+                        <a:rPr lang="fr-FR" sz="1600" dirty="0" smtClean="0"/>
+                        <a:t>Fonctionnalités</a:t>
+                      </a:r>
+                      <a:r>
+                        <a:rPr lang="fr-FR" sz="1600" baseline="0" dirty="0" smtClean="0"/>
+                        <a:t> Achevées</a:t>
+                      </a:r>
+                      <a:endParaRPr lang="fr-FR" sz="1600" dirty="0"/>
+                    </a:p>
+                  </a:txBody>
+                  <a:tcPr marT="144000">
+                    <a:solidFill>
+                      <a:schemeClr val="tx2">
+                        <a:lumMod val="75000"/>
+                      </a:schemeClr>
+                    </a:solidFill>
+                  </a:tcPr>
+                </a:tc>
+                <a:tc>
+                  <a:txBody>
+                    <a:bodyPr/>
+                    <a:lstStyle/>
+                    <a:p>
+                      <a:pPr algn="ctr"/>
+                      <a:r>
+                        <a:rPr lang="fr-FR" sz="1600" dirty="0" smtClean="0"/>
+                        <a:t>Fonctionnalités Testées</a:t>
+                      </a:r>
+                      <a:endParaRPr lang="fr-FR" sz="1600" dirty="0"/>
+                    </a:p>
+                  </a:txBody>
+                  <a:tcPr marT="144000">
+                    <a:solidFill>
+                      <a:schemeClr val="tx2">
+                        <a:lumMod val="75000"/>
+                      </a:schemeClr>
+                    </a:solidFill>
+                  </a:tcPr>
+                </a:tc>
+              </a:tr>
+              <a:tr h="605039">
+                <a:tc>
+                  <a:txBody>
+                    <a:bodyPr/>
+                    <a:lstStyle/>
+                    <a:p>
+                      <a:pPr algn="ctr"/>
+                      <a:r>
+                        <a:rPr lang="fr-FR" sz="1200" dirty="0" smtClean="0"/>
+                        <a:t>1</a:t>
+                      </a:r>
+                      <a:endParaRPr lang="fr-FR" sz="1200" dirty="0"/>
+                    </a:p>
+                  </a:txBody>
+                  <a:tcPr marT="144000"/>
+                </a:tc>
+                <a:tc>
+                  <a:txBody>
+                    <a:bodyPr/>
+                    <a:lstStyle/>
+                    <a:p>
+                      <a:r>
+                        <a:rPr lang="fr-FR" sz="1200" dirty="0" smtClean="0"/>
+                        <a:t>Choisir 5 PAC</a:t>
+                      </a:r>
+                      <a:endParaRPr lang="fr-FR" sz="1200" dirty="0"/>
+                    </a:p>
+                  </a:txBody>
+                  <a:tcPr marT="144000"/>
+                </a:tc>
+                <a:tc>
+                  <a:txBody>
+                    <a:bodyPr/>
+                    <a:lstStyle/>
+                    <a:p>
+                      <a:pPr algn="ctr"/>
+                      <a:r>
+                        <a:rPr lang="fr-FR" sz="1200" dirty="0" smtClean="0"/>
+                        <a:t>1, 2, 5</a:t>
+                      </a:r>
+                      <a:endParaRPr lang="fr-FR" sz="1200" dirty="0"/>
+                    </a:p>
+                  </a:txBody>
+                  <a:tcPr marT="144000"/>
+                </a:tc>
+                <a:tc>
+                  <a:txBody>
+                    <a:bodyPr/>
+                    <a:lstStyle/>
+                    <a:p>
+                      <a:pPr algn="ctr"/>
+                      <a:r>
+                        <a:rPr lang="fr-FR" sz="1200" dirty="0" smtClean="0"/>
+                        <a:t>6, 7</a:t>
+                      </a:r>
+                      <a:endParaRPr lang="fr-FR" sz="1200" dirty="0"/>
+                    </a:p>
+                  </a:txBody>
+                  <a:tcPr marT="144000"/>
+                </a:tc>
+                <a:tc>
+                  <a:txBody>
+                    <a:bodyPr/>
+                    <a:lstStyle/>
+                    <a:p>
+                      <a:pPr algn="ctr"/>
+                      <a:r>
+                        <a:rPr lang="fr-FR" sz="1200" dirty="0" smtClean="0"/>
+                        <a:t>3</a:t>
+                      </a:r>
+                      <a:endParaRPr lang="fr-FR" sz="1200" dirty="0"/>
+                    </a:p>
+                  </a:txBody>
+                  <a:tcPr marT="144000"/>
+                </a:tc>
+              </a:tr>
+              <a:tr h="605039">
+                <a:tc>
+                  <a:txBody>
+                    <a:bodyPr/>
+                    <a:lstStyle/>
+                    <a:p>
+                      <a:pPr algn="ctr"/>
+                      <a:r>
+                        <a:rPr lang="fr-FR" sz="1200" dirty="0" smtClean="0"/>
+                        <a:t>2</a:t>
+                      </a:r>
+                      <a:endParaRPr lang="fr-FR" sz="1200" dirty="0"/>
+                    </a:p>
+                  </a:txBody>
+                  <a:tcPr marT="144000"/>
+                </a:tc>
+                <a:tc>
+                  <a:txBody>
+                    <a:bodyPr/>
+                    <a:lstStyle/>
+                    <a:p>
+                      <a:r>
+                        <a:rPr lang="fr-FR" sz="1200" dirty="0" smtClean="0"/>
+                        <a:t>Choisir 1 PAC prioritaire (parmi les 5 PAC)</a:t>
+                      </a:r>
+                      <a:endParaRPr lang="fr-FR" sz="1200" dirty="0"/>
+                    </a:p>
+                  </a:txBody>
+                  <a:tcPr marT="144000"/>
+                </a:tc>
+                <a:tc>
+                  <a:txBody>
+                    <a:bodyPr/>
+                    <a:lstStyle/>
+                    <a:p>
+                      <a:pPr algn="ctr"/>
+                      <a:endParaRPr lang="fr-FR" sz="1200" dirty="0"/>
+                    </a:p>
+                  </a:txBody>
+                  <a:tcPr marT="144000"/>
+                </a:tc>
+                <a:tc>
+                  <a:txBody>
+                    <a:bodyPr/>
+                    <a:lstStyle/>
+                    <a:p>
+                      <a:pPr algn="ctr"/>
+                      <a:endParaRPr lang="fr-FR" sz="1200" dirty="0"/>
+                    </a:p>
+                  </a:txBody>
+                  <a:tcPr marT="144000"/>
+                </a:tc>
+                <a:tc>
+                  <a:txBody>
+                    <a:bodyPr/>
+                    <a:lstStyle/>
+                    <a:p>
+                      <a:pPr algn="ctr"/>
+                      <a:endParaRPr lang="fr-FR" sz="1200" dirty="0"/>
+                    </a:p>
+                  </a:txBody>
+                  <a:tcPr marT="144000"/>
+                </a:tc>
+              </a:tr>
+              <a:tr h="605039">
+                <a:tc>
+                  <a:txBody>
+                    <a:bodyPr/>
+                    <a:lstStyle/>
+                    <a:p>
+                      <a:pPr algn="ctr"/>
+                      <a:r>
+                        <a:rPr lang="fr-FR" sz="1200" dirty="0" smtClean="0"/>
+                        <a:t>3</a:t>
+                      </a:r>
+                      <a:endParaRPr lang="fr-FR" sz="1200" dirty="0"/>
+                    </a:p>
+                  </a:txBody>
+                  <a:tcPr marT="144000"/>
+                </a:tc>
+                <a:tc>
+                  <a:txBody>
+                    <a:bodyPr/>
+                    <a:lstStyle/>
+                    <a:p>
+                      <a:r>
+                        <a:rPr lang="fr-FR" sz="1200" dirty="0" smtClean="0"/>
+                        <a:t>Récupérer</a:t>
+                      </a:r>
+                      <a:r>
+                        <a:rPr lang="fr-FR" sz="1200" baseline="0" dirty="0" smtClean="0"/>
+                        <a:t> la position GPS  du User + SS de proximité  +  PAC /Veilleurs actifs de proximité (User online) </a:t>
+                      </a:r>
+                      <a:endParaRPr lang="fr-FR" sz="1200" dirty="0"/>
+                    </a:p>
+                  </a:txBody>
+                  <a:tcPr marT="144000"/>
+                </a:tc>
+                <a:tc>
+                  <a:txBody>
+                    <a:bodyPr/>
+                    <a:lstStyle/>
+                    <a:p>
+                      <a:pPr algn="ctr"/>
+                      <a:endParaRPr lang="fr-FR" sz="1200" dirty="0"/>
+                    </a:p>
+                  </a:txBody>
+                  <a:tcPr marT="144000"/>
+                </a:tc>
+                <a:tc>
+                  <a:txBody>
+                    <a:bodyPr/>
+                    <a:lstStyle/>
+                    <a:p>
+                      <a:pPr algn="ctr"/>
+                      <a:endParaRPr lang="fr-FR" sz="1200"/>
+                    </a:p>
+                  </a:txBody>
+                  <a:tcPr marT="144000"/>
+                </a:tc>
+                <a:tc>
+                  <a:txBody>
+                    <a:bodyPr/>
+                    <a:lstStyle/>
+                    <a:p>
+                      <a:pPr algn="ctr"/>
+                      <a:endParaRPr lang="fr-FR" sz="1200" dirty="0"/>
+                    </a:p>
+                  </a:txBody>
+                  <a:tcPr marT="144000"/>
+                </a:tc>
+              </a:tr>
+              <a:tr h="605039">
+                <a:tc>
+                  <a:txBody>
+                    <a:bodyPr/>
+                    <a:lstStyle/>
+                    <a:p>
+                      <a:pPr algn="ctr"/>
+                      <a:r>
+                        <a:rPr lang="fr-FR" sz="1200" dirty="0" smtClean="0"/>
+                        <a:t>4</a:t>
+                      </a:r>
+                      <a:endParaRPr lang="fr-FR" sz="1200" dirty="0"/>
+                    </a:p>
+                  </a:txBody>
+                  <a:tcPr marT="144000"/>
+                </a:tc>
+                <a:tc>
+                  <a:txBody>
+                    <a:bodyPr/>
+                    <a:lstStyle/>
+                    <a:p>
+                      <a:r>
+                        <a:rPr lang="fr-FR" sz="1200" dirty="0" smtClean="0"/>
+                        <a:t>Envoyer une alerte aux PAC  définis et ceux veilleurs actifs de proximité (User</a:t>
+                      </a:r>
+                      <a:r>
+                        <a:rPr lang="fr-FR" sz="1200" baseline="0" dirty="0" smtClean="0"/>
+                        <a:t> Online)</a:t>
+                      </a:r>
+                      <a:endParaRPr lang="fr-FR" sz="1200" dirty="0"/>
+                    </a:p>
+                  </a:txBody>
+                  <a:tcPr marT="144000"/>
+                </a:tc>
+                <a:tc>
+                  <a:txBody>
+                    <a:bodyPr/>
+                    <a:lstStyle/>
+                    <a:p>
+                      <a:pPr algn="ctr"/>
+                      <a:endParaRPr lang="fr-FR" sz="1200" dirty="0"/>
+                    </a:p>
+                  </a:txBody>
+                  <a:tcPr marT="144000"/>
+                </a:tc>
+                <a:tc>
+                  <a:txBody>
+                    <a:bodyPr/>
+                    <a:lstStyle/>
+                    <a:p>
+                      <a:pPr algn="ctr"/>
+                      <a:endParaRPr lang="fr-FR" sz="1200"/>
+                    </a:p>
+                  </a:txBody>
+                  <a:tcPr marT="144000"/>
+                </a:tc>
+                <a:tc>
+                  <a:txBody>
+                    <a:bodyPr/>
+                    <a:lstStyle/>
+                    <a:p>
+                      <a:pPr algn="ctr"/>
+                      <a:endParaRPr lang="fr-FR" sz="1200" dirty="0"/>
+                    </a:p>
+                  </a:txBody>
+                  <a:tcPr marT="144000"/>
+                </a:tc>
+              </a:tr>
+              <a:tr h="605039">
+                <a:tc>
+                  <a:txBody>
+                    <a:bodyPr/>
+                    <a:lstStyle/>
+                    <a:p>
+                      <a:pPr algn="ctr"/>
+                      <a:r>
+                        <a:rPr lang="fr-FR" sz="1200" dirty="0" smtClean="0"/>
+                        <a:t>5</a:t>
+                      </a:r>
+                      <a:endParaRPr lang="fr-FR" sz="1200" dirty="0"/>
+                    </a:p>
+                  </a:txBody>
+                  <a:tcPr marT="144000"/>
+                </a:tc>
+                <a:tc>
+                  <a:txBody>
+                    <a:bodyPr/>
+                    <a:lstStyle/>
+                    <a:p>
+                      <a:r>
+                        <a:rPr lang="fr-FR" sz="1200" dirty="0" smtClean="0"/>
+                        <a:t>Appeler le PAC prioritaire si le téléphone</a:t>
+                      </a:r>
+                      <a:r>
+                        <a:rPr lang="fr-FR" sz="1200" baseline="0" dirty="0" smtClean="0"/>
+                        <a:t> est crédité</a:t>
+                      </a:r>
+                      <a:endParaRPr lang="fr-FR" sz="1200" dirty="0"/>
+                    </a:p>
+                  </a:txBody>
+                  <a:tcPr marT="144000"/>
+                </a:tc>
+                <a:tc>
+                  <a:txBody>
+                    <a:bodyPr/>
+                    <a:lstStyle/>
+                    <a:p>
+                      <a:pPr algn="ctr"/>
+                      <a:endParaRPr lang="fr-FR" sz="1200" dirty="0"/>
+                    </a:p>
+                  </a:txBody>
+                  <a:tcPr marT="144000"/>
+                </a:tc>
+                <a:tc>
+                  <a:txBody>
+                    <a:bodyPr/>
+                    <a:lstStyle/>
+                    <a:p>
+                      <a:pPr algn="ctr"/>
+                      <a:endParaRPr lang="fr-FR" sz="1200" dirty="0"/>
+                    </a:p>
+                  </a:txBody>
+                  <a:tcPr marT="144000"/>
+                </a:tc>
+                <a:tc>
+                  <a:txBody>
+                    <a:bodyPr/>
+                    <a:lstStyle/>
+                    <a:p>
+                      <a:pPr algn="ctr"/>
+                      <a:endParaRPr lang="fr-FR" sz="1200" dirty="0"/>
+                    </a:p>
+                  </a:txBody>
+                  <a:tcPr marT="144000"/>
+                </a:tc>
+              </a:tr>
+              <a:tr h="605039">
+                <a:tc>
+                  <a:txBody>
+                    <a:bodyPr/>
+                    <a:lstStyle/>
+                    <a:p>
+                      <a:pPr algn="ctr"/>
+                      <a:r>
+                        <a:rPr lang="fr-FR" sz="1200" dirty="0" smtClean="0"/>
+                        <a:t>6</a:t>
+                      </a:r>
+                      <a:endParaRPr lang="fr-FR" sz="1200" dirty="0"/>
+                    </a:p>
+                  </a:txBody>
+                  <a:tcPr marT="144000"/>
+                </a:tc>
+                <a:tc>
+                  <a:txBody>
+                    <a:bodyPr/>
+                    <a:lstStyle/>
+                    <a:p>
+                      <a:r>
+                        <a:rPr lang="fr-FR" sz="1200" dirty="0" smtClean="0"/>
+                        <a:t>Usage simplifié du Smartphone pour afficher les icones de SS</a:t>
+                      </a:r>
+                      <a:endParaRPr lang="fr-FR" sz="1200" dirty="0"/>
+                    </a:p>
+                  </a:txBody>
+                  <a:tcPr marT="144000"/>
+                </a:tc>
+                <a:tc>
+                  <a:txBody>
+                    <a:bodyPr/>
+                    <a:lstStyle/>
+                    <a:p>
+                      <a:pPr algn="ctr"/>
+                      <a:endParaRPr lang="fr-FR" sz="1200" dirty="0"/>
+                    </a:p>
+                  </a:txBody>
+                  <a:tcPr marT="144000"/>
+                </a:tc>
+                <a:tc>
+                  <a:txBody>
+                    <a:bodyPr/>
+                    <a:lstStyle/>
+                    <a:p>
+                      <a:pPr algn="ctr"/>
+                      <a:endParaRPr lang="fr-FR" sz="1200"/>
+                    </a:p>
+                  </a:txBody>
+                  <a:tcPr marT="144000"/>
+                </a:tc>
+                <a:tc>
+                  <a:txBody>
+                    <a:bodyPr/>
+                    <a:lstStyle/>
+                    <a:p>
+                      <a:pPr algn="ctr"/>
+                      <a:endParaRPr lang="fr-FR" sz="1200" dirty="0"/>
+                    </a:p>
+                  </a:txBody>
+                  <a:tcPr marT="144000"/>
+                </a:tc>
+              </a:tr>
+              <a:tr h="605039">
+                <a:tc>
+                  <a:txBody>
+                    <a:bodyPr/>
+                    <a:lstStyle/>
+                    <a:p>
+                      <a:pPr algn="ctr"/>
+                      <a:r>
+                        <a:rPr lang="fr-FR" sz="1200" dirty="0" smtClean="0"/>
+                        <a:t>7</a:t>
+                      </a:r>
+                      <a:endParaRPr lang="fr-FR" sz="1200" dirty="0"/>
+                    </a:p>
+                  </a:txBody>
+                  <a:tcPr marT="144000"/>
+                </a:tc>
+                <a:tc>
+                  <a:txBody>
+                    <a:bodyPr/>
+                    <a:lstStyle/>
+                    <a:p>
+                      <a:pPr marL="0" marR="0" indent="0" algn="l" defTabSz="914400" rtl="0" eaLnBrk="1" fontAlgn="auto" latinLnBrk="0" hangingPunct="1">
+                        <a:lnSpc>
+                          <a:spcPct val="100000"/>
+                        </a:lnSpc>
+                        <a:spcBef>
+                          <a:spcPts val="0"/>
+                        </a:spcBef>
+                        <a:spcAft>
+                          <a:spcPts val="0"/>
+                        </a:spcAft>
+                        <a:buClrTx/>
+                        <a:buSzTx/>
+                        <a:buFontTx/>
+                        <a:buNone/>
+                        <a:tabLst/>
+                        <a:defRPr/>
+                      </a:pPr>
+                      <a:r>
+                        <a:rPr lang="fr-FR" sz="1200" dirty="0" smtClean="0"/>
+                        <a:t>Déclencher alerte silencieuse</a:t>
+                      </a:r>
+                    </a:p>
+                    <a:p>
+                      <a:endParaRPr lang="fr-FR" sz="1200" dirty="0"/>
+                    </a:p>
+                  </a:txBody>
+                  <a:tcPr marT="144000"/>
+                </a:tc>
+                <a:tc>
+                  <a:txBody>
+                    <a:bodyPr/>
+                    <a:lstStyle/>
+                    <a:p>
+                      <a:pPr algn="ctr"/>
+                      <a:endParaRPr lang="fr-FR" sz="1200" dirty="0"/>
+                    </a:p>
+                  </a:txBody>
+                  <a:tcPr marT="144000"/>
+                </a:tc>
+                <a:tc>
+                  <a:txBody>
+                    <a:bodyPr/>
+                    <a:lstStyle/>
+                    <a:p>
+                      <a:pPr algn="ctr"/>
+                      <a:endParaRPr lang="fr-FR" sz="1200" dirty="0"/>
+                    </a:p>
+                  </a:txBody>
+                  <a:tcPr marT="144000"/>
+                </a:tc>
+                <a:tc>
+                  <a:txBody>
+                    <a:bodyPr/>
+                    <a:lstStyle/>
+                    <a:p>
+                      <a:pPr algn="ctr"/>
+                      <a:endParaRPr lang="fr-FR" sz="1200" dirty="0"/>
+                    </a:p>
+                  </a:txBody>
+                  <a:tcPr marT="144000"/>
+                </a:tc>
+              </a:tr>
+            </a:tbl>
+          </a:graphicData>
+        </a:graphic>
+      </p:graphicFrame>
+      <p:cxnSp>
+        <p:nvCxnSpPr>
+          <p:cNvPr id="7" name="Connecteur droit avec flèche 6"/>
+          <p:cNvCxnSpPr>
+            <a:stCxn id="11" idx="1"/>
+          </p:cNvCxnSpPr>
+          <p:nvPr/>
+        </p:nvCxnSpPr>
+        <p:spPr>
+          <a:xfrm flipH="1" flipV="1">
+            <a:off x="6876256" y="2204864"/>
+            <a:ext cx="3240360" cy="1620180"/>
+          </a:xfrm>
+          <a:prstGeom prst="straightConnector1">
+            <a:avLst/>
+          </a:prstGeom>
           <a:ln>
             <a:solidFill>
-              <a:schemeClr val="accent5">
-                <a:lumMod val="75000"/>
-              </a:schemeClr>
+              <a:schemeClr val="tx2"/>
             </a:solidFill>
+            <a:tailEnd type="arrow"/>
           </a:ln>
+        </p:spPr>
+        <p:style>
+          <a:lnRef idx="1">
+            <a:schemeClr val="accent1"/>
+          </a:lnRef>
+          <a:fillRef idx="0">
+            <a:schemeClr val="accent1"/>
+          </a:fillRef>
+          <a:effectRef idx="0">
+            <a:schemeClr val="accent1"/>
+          </a:effectRef>
+          <a:fontRef idx="minor">
+            <a:schemeClr val="tx1"/>
+          </a:fontRef>
+        </p:style>
+      </p:cxnSp>
+      <p:sp>
+        <p:nvSpPr>
+          <p:cNvPr id="11" name="Rectangle à coins arrondis 10"/>
+          <p:cNvSpPr/>
+          <p:nvPr/>
+        </p:nvSpPr>
+        <p:spPr>
+          <a:xfrm>
+            <a:off x="10116616" y="3140968"/>
+            <a:ext cx="2088232" cy="1368152"/>
+          </a:xfrm>
+          <a:prstGeom prst="roundRect">
+            <a:avLst/>
+          </a:prstGeom>
         </p:spPr>
         <p:style>
           <a:lnRef idx="2">
@@ -10788,60 +11605,72 @@
           <a:bodyPr rtlCol="0" anchor="ctr"/>
           <a:lstStyle/>
           <a:p>
-            <a:pPr algn="ctr"/>
-            <a:r>
-              <a:rPr lang="fr-FR" sz="1300" dirty="0" smtClean="0">
-                <a:solidFill>
-                  <a:schemeClr val="tx1"/>
-                </a:solidFill>
-              </a:rPr>
-              <a:t>PopUp </a:t>
-            </a:r>
-          </a:p>
-          <a:p>
-            <a:pPr algn="ctr"/>
-            <a:r>
-              <a:rPr lang="fr-FR" sz="1300" dirty="0" smtClean="0">
-                <a:solidFill>
-                  <a:schemeClr val="tx1"/>
-                </a:solidFill>
-              </a:rPr>
-              <a:t>Affichage I</a:t>
-            </a:r>
-            <a:r>
-              <a:rPr lang="fr-FR" sz="1300" dirty="0" smtClean="0">
-                <a:solidFill>
-                  <a:schemeClr val="tx1"/>
-                </a:solidFill>
-              </a:rPr>
-              <a:t>cones</a:t>
-            </a:r>
-            <a:endParaRPr lang="fr-FR" sz="1300" dirty="0" smtClean="0">
-              <a:solidFill>
-                <a:srgbClr val="FF0000"/>
-              </a:solidFill>
-            </a:endParaRPr>
+            <a:r>
+              <a:rPr lang="fr-FR" sz="1200" dirty="0" smtClean="0"/>
+              <a:t>Ces trois dernières colonnes sont un exemple de remplissage du tableau</a:t>
+            </a:r>
+            <a:endParaRPr lang="fr-FR" sz="1200" dirty="0"/>
           </a:p>
         </p:txBody>
       </p:sp>
       <p:cxnSp>
         <p:nvCxnSpPr>
-          <p:cNvPr id="24" name="Connecteur droit avec flèche 23"/>
+          <p:cNvPr id="13" name="Connecteur droit avec flèche 12"/>
           <p:cNvCxnSpPr>
-            <a:stCxn id="23" idx="2"/>
-            <a:endCxn id="2050" idx="0"/>
+            <a:stCxn id="11" idx="1"/>
           </p:cNvCxnSpPr>
           <p:nvPr/>
         </p:nvCxnSpPr>
         <p:spPr>
-          <a:xfrm flipH="1">
-            <a:off x="4423728" y="1988840"/>
-            <a:ext cx="4256" cy="792088"/>
+          <a:xfrm flipH="1" flipV="1">
+            <a:off x="5364088" y="2204864"/>
+            <a:ext cx="4752528" cy="1620180"/>
           </a:xfrm>
           <a:prstGeom prst="straightConnector1">
             <a:avLst/>
           </a:prstGeom>
           <a:ln>
+            <a:solidFill>
+              <a:schemeClr val="tx2"/>
+            </a:solidFill>
+            <a:tailEnd type="arrow"/>
+          </a:ln>
+        </p:spPr>
+        <p:style>
+          <a:lnRef idx="1">
+            <a:schemeClr val="accent1"/>
+          </a:lnRef>
+          <a:fillRef idx="0">
+            <a:schemeClr val="accent1"/>
+          </a:fillRef>
+          <a:effectRef idx="0">
+            <a:schemeClr val="accent1"/>
+          </a:effectRef>
+          <a:fontRef idx="minor">
+            <a:schemeClr val="tx1"/>
+          </a:fontRef>
+        </p:style>
+      </p:cxnSp>
+      <p:cxnSp>
+        <p:nvCxnSpPr>
+          <p:cNvPr id="16" name="Connecteur droit avec flèche 15"/>
+          <p:cNvCxnSpPr>
+            <a:stCxn id="11" idx="1"/>
+          </p:cNvCxnSpPr>
+          <p:nvPr/>
+        </p:nvCxnSpPr>
+        <p:spPr>
+          <a:xfrm flipH="1" flipV="1">
+            <a:off x="8172400" y="2204864"/>
+            <a:ext cx="1944216" cy="1620180"/>
+          </a:xfrm>
+          <a:prstGeom prst="straightConnector1">
+            <a:avLst/>
+          </a:prstGeom>
+          <a:ln>
+            <a:solidFill>
+              <a:schemeClr val="tx2"/>
+            </a:solidFill>
             <a:tailEnd type="arrow"/>
           </a:ln>
         </p:spPr>
@@ -10942,8 +11771,13 @@
                   <a:schemeClr val="bg1"/>
                 </a:solidFill>
               </a:rPr>
-              <a:t>Propositions De Modifications</a:t>
-            </a:r>
+              <a:t>Le BackLog</a:t>
+            </a:r>
+            <a:endParaRPr lang="fr-FR" sz="2800" b="1" cap="small" dirty="0" smtClean="0">
+              <a:solidFill>
+                <a:schemeClr val="bg1"/>
+              </a:solidFill>
+            </a:endParaRPr>
           </a:p>
         </p:txBody>
       </p:sp>
@@ -10998,8 +11832,1161 @@
                   <a:schemeClr val="tx1"/>
                 </a:solidFill>
               </a:rPr>
+              <a:t>CHART </a:t>
+            </a:r>
+            <a:r>
+              <a:rPr lang="fr-FR" sz="2800" b="1" dirty="0" smtClean="0">
+                <a:solidFill>
+                  <a:schemeClr val="tx1"/>
+                </a:solidFill>
+              </a:rPr>
+              <a:t>– 1 </a:t>
+            </a:r>
+          </a:p>
+          <a:p>
+            <a:pPr algn="ctr"/>
+            <a:r>
+              <a:rPr lang="fr-FR" sz="1500" b="1" dirty="0" smtClean="0">
+                <a:solidFill>
+                  <a:schemeClr val="tx1"/>
+                </a:solidFill>
+              </a:rPr>
+              <a:t>Ici sont listées les fonctionnalités par ordre de priorité (les plus importantes sont en haut).</a:t>
+            </a:r>
+            <a:endParaRPr lang="fr-FR" sz="1500" b="1" dirty="0">
+              <a:solidFill>
+                <a:schemeClr val="tx1"/>
+              </a:solidFill>
+            </a:endParaRPr>
+          </a:p>
+        </p:txBody>
+      </p:sp>
+      <p:graphicFrame>
+        <p:nvGraphicFramePr>
+          <p:cNvPr id="8" name="Tableau 7"/>
+          <p:cNvGraphicFramePr>
+            <a:graphicFrameLocks noGrp="1"/>
+          </p:cNvGraphicFramePr>
+          <p:nvPr/>
+        </p:nvGraphicFramePr>
+        <p:xfrm>
+          <a:off x="1259632" y="1119310"/>
+          <a:ext cx="7620004" cy="5045994"/>
+        </p:xfrm>
+        <a:graphic>
+          <a:graphicData uri="http://schemas.openxmlformats.org/drawingml/2006/table">
+            <a:tbl>
+              <a:tblPr firstRow="1" bandRow="1">
+                <a:tableStyleId>{5C22544A-7EE6-4342-B048-85BDC9FD1C3A}</a:tableStyleId>
+              </a:tblPr>
+              <a:tblGrid>
+                <a:gridCol w="720080"/>
+                <a:gridCol w="2376264"/>
+                <a:gridCol w="1512168"/>
+                <a:gridCol w="1512169"/>
+                <a:gridCol w="1499323"/>
+              </a:tblGrid>
+              <a:tr h="605039">
+                <a:tc>
+                  <a:txBody>
+                    <a:bodyPr/>
+                    <a:lstStyle/>
+                    <a:p>
+                      <a:pPr algn="ctr"/>
+                      <a:r>
+                        <a:rPr lang="fr-FR" sz="1600" dirty="0" smtClean="0"/>
+                        <a:t>ID</a:t>
+                      </a:r>
+                      <a:endParaRPr lang="fr-FR" sz="1600" dirty="0"/>
+                    </a:p>
+                  </a:txBody>
+                  <a:tcPr marT="144000">
+                    <a:solidFill>
+                      <a:schemeClr val="tx2">
+                        <a:lumMod val="75000"/>
+                      </a:schemeClr>
+                    </a:solidFill>
+                  </a:tcPr>
+                </a:tc>
+                <a:tc>
+                  <a:txBody>
+                    <a:bodyPr/>
+                    <a:lstStyle/>
+                    <a:p>
+                      <a:pPr algn="ctr"/>
+                      <a:r>
+                        <a:rPr lang="fr-FR" sz="1600" dirty="0" smtClean="0"/>
+                        <a:t>Liste</a:t>
+                      </a:r>
+                      <a:endParaRPr lang="fr-FR" sz="1600" dirty="0"/>
+                    </a:p>
+                  </a:txBody>
+                  <a:tcPr marT="144000">
+                    <a:solidFill>
+                      <a:schemeClr val="tx2">
+                        <a:lumMod val="75000"/>
+                      </a:schemeClr>
+                    </a:solidFill>
+                  </a:tcPr>
+                </a:tc>
+                <a:tc>
+                  <a:txBody>
+                    <a:bodyPr/>
+                    <a:lstStyle/>
+                    <a:p>
+                      <a:pPr algn="ctr"/>
+                      <a:r>
+                        <a:rPr lang="fr-FR" sz="1600" dirty="0" smtClean="0"/>
+                        <a:t>En cours de Dév.</a:t>
+                      </a:r>
+                      <a:endParaRPr lang="fr-FR" sz="1600" dirty="0"/>
+                    </a:p>
+                  </a:txBody>
+                  <a:tcPr marT="144000">
+                    <a:solidFill>
+                      <a:schemeClr val="tx2">
+                        <a:lumMod val="75000"/>
+                      </a:schemeClr>
+                    </a:solidFill>
+                  </a:tcPr>
+                </a:tc>
+                <a:tc>
+                  <a:txBody>
+                    <a:bodyPr/>
+                    <a:lstStyle/>
+                    <a:p>
+                      <a:pPr algn="ctr"/>
+                      <a:r>
+                        <a:rPr lang="fr-FR" sz="1600" dirty="0" smtClean="0"/>
+                        <a:t>Fonctionnalités</a:t>
+                      </a:r>
+                      <a:r>
+                        <a:rPr lang="fr-FR" sz="1600" baseline="0" dirty="0" smtClean="0"/>
+                        <a:t> Achevées</a:t>
+                      </a:r>
+                      <a:endParaRPr lang="fr-FR" sz="1600" dirty="0"/>
+                    </a:p>
+                  </a:txBody>
+                  <a:tcPr marT="144000">
+                    <a:solidFill>
+                      <a:schemeClr val="tx2">
+                        <a:lumMod val="75000"/>
+                      </a:schemeClr>
+                    </a:solidFill>
+                  </a:tcPr>
+                </a:tc>
+                <a:tc>
+                  <a:txBody>
+                    <a:bodyPr/>
+                    <a:lstStyle/>
+                    <a:p>
+                      <a:pPr algn="ctr"/>
+                      <a:r>
+                        <a:rPr lang="fr-FR" sz="1600" dirty="0" smtClean="0"/>
+                        <a:t>Fonctionnalités Testées</a:t>
+                      </a:r>
+                      <a:endParaRPr lang="fr-FR" sz="1600" dirty="0"/>
+                    </a:p>
+                  </a:txBody>
+                  <a:tcPr marT="144000">
+                    <a:solidFill>
+                      <a:schemeClr val="tx2">
+                        <a:lumMod val="75000"/>
+                      </a:schemeClr>
+                    </a:solidFill>
+                  </a:tcPr>
+                </a:tc>
+              </a:tr>
+              <a:tr h="605039">
+                <a:tc>
+                  <a:txBody>
+                    <a:bodyPr/>
+                    <a:lstStyle/>
+                    <a:p>
+                      <a:pPr algn="ctr"/>
+                      <a:r>
+                        <a:rPr lang="fr-FR" sz="1200" dirty="0" smtClean="0"/>
+                        <a:t>8</a:t>
+                      </a:r>
+                      <a:endParaRPr lang="fr-FR" sz="1200" dirty="0"/>
+                    </a:p>
+                  </a:txBody>
+                  <a:tcPr marT="144000"/>
+                </a:tc>
+                <a:tc>
+                  <a:txBody>
+                    <a:bodyPr/>
+                    <a:lstStyle/>
+                    <a:p>
+                      <a:r>
+                        <a:rPr lang="fr-FR" sz="1200" dirty="0" smtClean="0"/>
+                        <a:t>Déclencher alerte non silencieuse (sirène)</a:t>
+                      </a:r>
+                      <a:endParaRPr lang="fr-FR" sz="1200" dirty="0"/>
+                    </a:p>
+                  </a:txBody>
+                  <a:tcPr marT="144000"/>
+                </a:tc>
+                <a:tc>
+                  <a:txBody>
+                    <a:bodyPr/>
+                    <a:lstStyle/>
+                    <a:p>
+                      <a:pPr algn="ctr"/>
+                      <a:endParaRPr lang="fr-FR" sz="1200" dirty="0"/>
+                    </a:p>
+                  </a:txBody>
+                  <a:tcPr marT="144000"/>
+                </a:tc>
+                <a:tc>
+                  <a:txBody>
+                    <a:bodyPr/>
+                    <a:lstStyle/>
+                    <a:p>
+                      <a:pPr algn="ctr"/>
+                      <a:endParaRPr lang="fr-FR" sz="1200" dirty="0"/>
+                    </a:p>
+                  </a:txBody>
+                  <a:tcPr marT="144000"/>
+                </a:tc>
+                <a:tc>
+                  <a:txBody>
+                    <a:bodyPr/>
+                    <a:lstStyle/>
+                    <a:p>
+                      <a:pPr algn="ctr"/>
+                      <a:endParaRPr lang="fr-FR" sz="1200" dirty="0"/>
+                    </a:p>
+                  </a:txBody>
+                  <a:tcPr marT="144000"/>
+                </a:tc>
+              </a:tr>
+              <a:tr h="605039">
+                <a:tc>
+                  <a:txBody>
+                    <a:bodyPr/>
+                    <a:lstStyle/>
+                    <a:p>
+                      <a:pPr algn="ctr"/>
+                      <a:r>
+                        <a:rPr lang="fr-FR" sz="1200" dirty="0" smtClean="0"/>
+                        <a:t>9</a:t>
+                      </a:r>
+                      <a:endParaRPr lang="fr-FR" sz="1200" dirty="0"/>
+                    </a:p>
+                  </a:txBody>
+                  <a:tcPr marT="144000"/>
+                </a:tc>
+                <a:tc>
+                  <a:txBody>
+                    <a:bodyPr/>
+                    <a:lstStyle/>
+                    <a:p>
+                      <a:pPr marL="0" marR="0" indent="0" algn="l" defTabSz="914400" rtl="0" eaLnBrk="1" fontAlgn="auto" latinLnBrk="0" hangingPunct="1">
+                        <a:lnSpc>
+                          <a:spcPct val="100000"/>
+                        </a:lnSpc>
+                        <a:spcBef>
+                          <a:spcPts val="0"/>
+                        </a:spcBef>
+                        <a:spcAft>
+                          <a:spcPts val="0"/>
+                        </a:spcAft>
+                        <a:buClrTx/>
+                        <a:buSzTx/>
+                        <a:buFontTx/>
+                        <a:buNone/>
+                        <a:tabLst/>
+                        <a:defRPr/>
+                      </a:pPr>
+                      <a:r>
+                        <a:rPr lang="fr-FR" sz="1200" dirty="0" smtClean="0"/>
+                        <a:t>Envoyer une alerte aux PAC </a:t>
+                      </a:r>
+                      <a:r>
+                        <a:rPr lang="fr-FR" sz="1200" dirty="0" smtClean="0"/>
+                        <a:t> définis (User</a:t>
+                      </a:r>
+                      <a:r>
+                        <a:rPr lang="fr-FR" sz="1200" baseline="0" dirty="0" smtClean="0"/>
+                        <a:t> offline</a:t>
+                      </a:r>
+                      <a:r>
+                        <a:rPr lang="fr-FR" sz="1200" baseline="0" dirty="0" smtClean="0"/>
+                        <a:t>)</a:t>
+                      </a:r>
+                      <a:endParaRPr lang="fr-FR" sz="1200" dirty="0" smtClean="0"/>
+                    </a:p>
+                  </a:txBody>
+                  <a:tcPr marT="144000"/>
+                </a:tc>
+                <a:tc>
+                  <a:txBody>
+                    <a:bodyPr/>
+                    <a:lstStyle/>
+                    <a:p>
+                      <a:pPr algn="ctr"/>
+                      <a:endParaRPr lang="fr-FR" sz="1200" dirty="0"/>
+                    </a:p>
+                  </a:txBody>
+                  <a:tcPr marT="144000"/>
+                </a:tc>
+                <a:tc>
+                  <a:txBody>
+                    <a:bodyPr/>
+                    <a:lstStyle/>
+                    <a:p>
+                      <a:pPr algn="ctr"/>
+                      <a:endParaRPr lang="fr-FR" sz="1200"/>
+                    </a:p>
+                  </a:txBody>
+                  <a:tcPr marT="144000"/>
+                </a:tc>
+                <a:tc>
+                  <a:txBody>
+                    <a:bodyPr/>
+                    <a:lstStyle/>
+                    <a:p>
+                      <a:pPr algn="ctr"/>
+                      <a:endParaRPr lang="fr-FR" sz="1200" dirty="0"/>
+                    </a:p>
+                  </a:txBody>
+                  <a:tcPr marT="144000"/>
+                </a:tc>
+              </a:tr>
+              <a:tr h="605039">
+                <a:tc>
+                  <a:txBody>
+                    <a:bodyPr/>
+                    <a:lstStyle/>
+                    <a:p>
+                      <a:pPr algn="ctr"/>
+                      <a:r>
+                        <a:rPr lang="fr-FR" sz="1200" dirty="0" smtClean="0"/>
+                        <a:t>10</a:t>
+                      </a:r>
+                      <a:endParaRPr lang="fr-FR" sz="1200" dirty="0"/>
+                    </a:p>
+                  </a:txBody>
+                  <a:tcPr marT="144000"/>
+                </a:tc>
+                <a:tc>
+                  <a:txBody>
+                    <a:bodyPr/>
+                    <a:lstStyle/>
+                    <a:p>
+                      <a:r>
+                        <a:rPr lang="fr-FR" sz="1200" dirty="0" smtClean="0"/>
+                        <a:t>Récupérer</a:t>
+                      </a:r>
+                      <a:r>
+                        <a:rPr lang="fr-FR" sz="1200" baseline="0" dirty="0" smtClean="0"/>
+                        <a:t> la dernière position GPS  connue du User (User offline)</a:t>
+                      </a:r>
+                      <a:endParaRPr lang="fr-FR" sz="1200" dirty="0"/>
+                    </a:p>
+                  </a:txBody>
+                  <a:tcPr marT="144000"/>
+                </a:tc>
+                <a:tc>
+                  <a:txBody>
+                    <a:bodyPr/>
+                    <a:lstStyle/>
+                    <a:p>
+                      <a:pPr algn="ctr"/>
+                      <a:endParaRPr lang="fr-FR" sz="1200"/>
+                    </a:p>
+                  </a:txBody>
+                  <a:tcPr marT="144000"/>
+                </a:tc>
+                <a:tc>
+                  <a:txBody>
+                    <a:bodyPr/>
+                    <a:lstStyle/>
+                    <a:p>
+                      <a:pPr algn="ctr"/>
+                      <a:endParaRPr lang="fr-FR" sz="1200"/>
+                    </a:p>
+                  </a:txBody>
+                  <a:tcPr marT="144000"/>
+                </a:tc>
+                <a:tc>
+                  <a:txBody>
+                    <a:bodyPr/>
+                    <a:lstStyle/>
+                    <a:p>
+                      <a:pPr algn="ctr"/>
+                      <a:endParaRPr lang="fr-FR" sz="1200" dirty="0"/>
+                    </a:p>
+                  </a:txBody>
+                  <a:tcPr marT="144000"/>
+                </a:tc>
+              </a:tr>
+              <a:tr h="605039">
+                <a:tc>
+                  <a:txBody>
+                    <a:bodyPr/>
+                    <a:lstStyle/>
+                    <a:p>
+                      <a:pPr algn="ctr"/>
+                      <a:r>
+                        <a:rPr lang="fr-FR" sz="1200" dirty="0" smtClean="0"/>
+                        <a:t>11</a:t>
+                      </a:r>
+                      <a:endParaRPr lang="fr-FR" sz="1200" dirty="0"/>
+                    </a:p>
+                  </a:txBody>
+                  <a:tcPr marT="144000"/>
+                </a:tc>
+                <a:tc>
+                  <a:txBody>
+                    <a:bodyPr/>
+                    <a:lstStyle/>
+                    <a:p>
+                      <a:pPr marL="0" marR="0" indent="0" algn="l" defTabSz="914400" rtl="0" eaLnBrk="1" fontAlgn="auto" latinLnBrk="0" hangingPunct="1">
+                        <a:lnSpc>
+                          <a:spcPct val="100000"/>
+                        </a:lnSpc>
+                        <a:spcBef>
+                          <a:spcPts val="0"/>
+                        </a:spcBef>
+                        <a:spcAft>
+                          <a:spcPts val="0"/>
+                        </a:spcAft>
+                        <a:buClrTx/>
+                        <a:buSzTx/>
+                        <a:buFontTx/>
+                        <a:buNone/>
+                        <a:tabLst/>
+                        <a:defRPr/>
+                      </a:pPr>
+                      <a:r>
+                        <a:rPr lang="fr-FR" sz="1200" dirty="0" smtClean="0"/>
+                        <a:t>Recevoir la confirmation de</a:t>
+                      </a:r>
+                      <a:r>
+                        <a:rPr lang="fr-FR" sz="1200" baseline="0" dirty="0" smtClean="0"/>
+                        <a:t> réception </a:t>
+                      </a:r>
+                      <a:r>
+                        <a:rPr lang="fr-FR" sz="1200" dirty="0" smtClean="0"/>
+                        <a:t> de</a:t>
+                      </a:r>
+                      <a:r>
+                        <a:rPr lang="fr-FR" sz="1200" baseline="0" dirty="0" smtClean="0"/>
+                        <a:t> l’</a:t>
+                      </a:r>
+                      <a:r>
+                        <a:rPr lang="fr-FR" sz="1200" dirty="0" smtClean="0"/>
+                        <a:t>alerte</a:t>
+                      </a:r>
+                    </a:p>
+                  </a:txBody>
+                  <a:tcPr marT="144000"/>
+                </a:tc>
+                <a:tc>
+                  <a:txBody>
+                    <a:bodyPr/>
+                    <a:lstStyle/>
+                    <a:p>
+                      <a:pPr algn="ctr"/>
+                      <a:endParaRPr lang="fr-FR" sz="1200"/>
+                    </a:p>
+                  </a:txBody>
+                  <a:tcPr marT="144000"/>
+                </a:tc>
+                <a:tc>
+                  <a:txBody>
+                    <a:bodyPr/>
+                    <a:lstStyle/>
+                    <a:p>
+                      <a:pPr algn="ctr"/>
+                      <a:endParaRPr lang="fr-FR" sz="1200"/>
+                    </a:p>
+                  </a:txBody>
+                  <a:tcPr marT="144000"/>
+                </a:tc>
+                <a:tc>
+                  <a:txBody>
+                    <a:bodyPr/>
+                    <a:lstStyle/>
+                    <a:p>
+                      <a:pPr algn="ctr"/>
+                      <a:endParaRPr lang="fr-FR" sz="1200" dirty="0"/>
+                    </a:p>
+                  </a:txBody>
+                  <a:tcPr marT="144000"/>
+                </a:tc>
+              </a:tr>
+              <a:tr h="605039">
+                <a:tc>
+                  <a:txBody>
+                    <a:bodyPr/>
+                    <a:lstStyle/>
+                    <a:p>
+                      <a:pPr algn="ctr"/>
+                      <a:r>
+                        <a:rPr lang="fr-FR" sz="1200" dirty="0" smtClean="0"/>
+                        <a:t>12</a:t>
+                      </a:r>
+                      <a:endParaRPr lang="fr-FR" sz="1200" dirty="0"/>
+                    </a:p>
+                  </a:txBody>
+                  <a:tcPr marT="144000"/>
+                </a:tc>
+                <a:tc>
+                  <a:txBody>
+                    <a:bodyPr/>
+                    <a:lstStyle/>
+                    <a:p>
+                      <a:r>
+                        <a:rPr lang="fr-FR" sz="1200" dirty="0" smtClean="0"/>
+                        <a:t>Détecter</a:t>
+                      </a:r>
+                      <a:r>
+                        <a:rPr lang="fr-FR" sz="1200" baseline="0" dirty="0" smtClean="0"/>
+                        <a:t> les activités irrégulières du Smartphone (veille active)</a:t>
+                      </a:r>
+                      <a:endParaRPr lang="fr-FR" sz="1200" dirty="0"/>
+                    </a:p>
+                  </a:txBody>
+                  <a:tcPr marT="144000"/>
+                </a:tc>
+                <a:tc>
+                  <a:txBody>
+                    <a:bodyPr/>
+                    <a:lstStyle/>
+                    <a:p>
+                      <a:pPr algn="ctr"/>
+                      <a:endParaRPr lang="fr-FR" sz="1200"/>
+                    </a:p>
+                  </a:txBody>
+                  <a:tcPr marT="144000"/>
+                </a:tc>
+                <a:tc>
+                  <a:txBody>
+                    <a:bodyPr/>
+                    <a:lstStyle/>
+                    <a:p>
+                      <a:pPr algn="ctr"/>
+                      <a:endParaRPr lang="fr-FR" sz="1200"/>
+                    </a:p>
+                  </a:txBody>
+                  <a:tcPr marT="144000"/>
+                </a:tc>
+                <a:tc>
+                  <a:txBody>
+                    <a:bodyPr/>
+                    <a:lstStyle/>
+                    <a:p>
+                      <a:pPr algn="ctr"/>
+                      <a:endParaRPr lang="fr-FR" sz="1200" dirty="0"/>
+                    </a:p>
+                  </a:txBody>
+                  <a:tcPr marT="144000"/>
+                </a:tc>
+              </a:tr>
+              <a:tr h="605039">
+                <a:tc>
+                  <a:txBody>
+                    <a:bodyPr/>
+                    <a:lstStyle/>
+                    <a:p>
+                      <a:pPr algn="ctr"/>
+                      <a:r>
+                        <a:rPr lang="fr-FR" sz="1200" dirty="0" smtClean="0"/>
+                        <a:t>13</a:t>
+                      </a:r>
+                      <a:endParaRPr lang="fr-FR" sz="1200" dirty="0"/>
+                    </a:p>
+                  </a:txBody>
+                  <a:tcPr marT="144000"/>
+                </a:tc>
+                <a:tc>
+                  <a:txBody>
+                    <a:bodyPr/>
+                    <a:lstStyle/>
+                    <a:p>
+                      <a:r>
+                        <a:rPr lang="fr-FR" sz="1200" dirty="0" smtClean="0"/>
+                        <a:t>Personnaliser</a:t>
+                      </a:r>
+                      <a:r>
+                        <a:rPr lang="fr-FR" sz="1200" baseline="0" dirty="0" smtClean="0"/>
+                        <a:t> la notification d’alerte chez le PAC (silencieux ou musique/tonalité, etc.)</a:t>
+                      </a:r>
+                      <a:endParaRPr lang="fr-FR" sz="1200" dirty="0"/>
+                    </a:p>
+                  </a:txBody>
+                  <a:tcPr marT="144000"/>
+                </a:tc>
+                <a:tc>
+                  <a:txBody>
+                    <a:bodyPr/>
+                    <a:lstStyle/>
+                    <a:p>
+                      <a:pPr algn="ctr"/>
+                      <a:endParaRPr lang="fr-FR" sz="1200"/>
+                    </a:p>
+                  </a:txBody>
+                  <a:tcPr marT="144000"/>
+                </a:tc>
+                <a:tc>
+                  <a:txBody>
+                    <a:bodyPr/>
+                    <a:lstStyle/>
+                    <a:p>
+                      <a:pPr algn="ctr"/>
+                      <a:endParaRPr lang="fr-FR" sz="1200"/>
+                    </a:p>
+                  </a:txBody>
+                  <a:tcPr marT="144000"/>
+                </a:tc>
+                <a:tc>
+                  <a:txBody>
+                    <a:bodyPr/>
+                    <a:lstStyle/>
+                    <a:p>
+                      <a:pPr algn="ctr"/>
+                      <a:endParaRPr lang="fr-FR" sz="1200" dirty="0"/>
+                    </a:p>
+                  </a:txBody>
+                  <a:tcPr marT="144000"/>
+                </a:tc>
+              </a:tr>
+              <a:tr h="605039">
+                <a:tc>
+                  <a:txBody>
+                    <a:bodyPr/>
+                    <a:lstStyle/>
+                    <a:p>
+                      <a:pPr algn="ctr"/>
+                      <a:r>
+                        <a:rPr lang="fr-FR" sz="1200" smtClean="0"/>
+                        <a:t>14</a:t>
+                      </a:r>
+                      <a:endParaRPr lang="fr-FR" sz="1200" dirty="0"/>
+                    </a:p>
+                  </a:txBody>
+                  <a:tcPr marT="144000"/>
+                </a:tc>
+                <a:tc>
+                  <a:txBody>
+                    <a:bodyPr/>
+                    <a:lstStyle/>
+                    <a:p>
+                      <a:r>
+                        <a:rPr lang="fr-FR" sz="1200" dirty="0" smtClean="0"/>
+                        <a:t>Personnaliser le message d’alerte à envoyer aux PAC</a:t>
+                      </a:r>
+                      <a:endParaRPr lang="fr-FR" sz="1200" dirty="0"/>
+                    </a:p>
+                  </a:txBody>
+                  <a:tcPr marT="144000"/>
+                </a:tc>
+                <a:tc>
+                  <a:txBody>
+                    <a:bodyPr/>
+                    <a:lstStyle/>
+                    <a:p>
+                      <a:pPr algn="ctr"/>
+                      <a:endParaRPr lang="fr-FR" sz="1200" dirty="0"/>
+                    </a:p>
+                  </a:txBody>
+                  <a:tcPr marT="144000"/>
+                </a:tc>
+                <a:tc>
+                  <a:txBody>
+                    <a:bodyPr/>
+                    <a:lstStyle/>
+                    <a:p>
+                      <a:pPr algn="ctr"/>
+                      <a:endParaRPr lang="fr-FR" sz="1200" dirty="0"/>
+                    </a:p>
+                  </a:txBody>
+                  <a:tcPr marT="144000"/>
+                </a:tc>
+                <a:tc>
+                  <a:txBody>
+                    <a:bodyPr/>
+                    <a:lstStyle/>
+                    <a:p>
+                      <a:pPr algn="ctr"/>
+                      <a:endParaRPr lang="fr-FR" sz="1200" dirty="0"/>
+                    </a:p>
+                  </a:txBody>
+                  <a:tcPr marT="144000"/>
+                </a:tc>
+              </a:tr>
+            </a:tbl>
+          </a:graphicData>
+        </a:graphic>
+      </p:graphicFrame>
+    </p:spTree>
+  </p:cSld>
+  <p:clrMapOvr>
+    <a:masterClrMapping/>
+  </p:clrMapOvr>
+  <p:timing>
+    <p:tnLst>
+      <p:par>
+        <p:cTn id="1" dur="indefinite" restart="never" nodeType="tmRoot"/>
+      </p:par>
+    </p:tnLst>
+  </p:timing>
+</p:sld>
+</file>
+
+<file path=ppt/slides/slide8.xml><?xml version="1.0" encoding="utf-8"?>
+<p:sld xmlns:a="http://schemas.openxmlformats.org/drawingml/2006/main" xmlns:r="http://schemas.openxmlformats.org/officeDocument/2006/relationships" xmlns:p="http://schemas.openxmlformats.org/presentationml/2006/main">
+  <p:cSld>
+    <p:spTree>
+      <p:nvGrpSpPr>
+        <p:cNvPr id="1" name=""/>
+        <p:cNvGrpSpPr/>
+        <p:nvPr/>
+      </p:nvGrpSpPr>
+      <p:grpSpPr>
+        <a:xfrm>
+          <a:off x="0" y="0"/>
+          <a:ext cx="0" cy="0"/>
+          <a:chOff x="0" y="0"/>
+          <a:chExt cx="0" cy="0"/>
+        </a:xfrm>
+      </p:grpSpPr>
+      <p:sp>
+        <p:nvSpPr>
+          <p:cNvPr id="158" name="Rectangle 157"/>
+          <p:cNvSpPr/>
+          <p:nvPr/>
+        </p:nvSpPr>
+        <p:spPr>
+          <a:xfrm>
+            <a:off x="-36512" y="0"/>
+            <a:ext cx="899592" cy="6858000"/>
+          </a:xfrm>
+          <a:prstGeom prst="rect">
+            <a:avLst/>
+          </a:prstGeom>
+          <a:solidFill>
+            <a:schemeClr val="accent1">
+              <a:lumMod val="50000"/>
+            </a:schemeClr>
+          </a:solidFill>
+          <a:ln>
+            <a:noFill/>
+          </a:ln>
+        </p:spPr>
+        <p:style>
+          <a:lnRef idx="2">
+            <a:schemeClr val="accent1">
+              <a:shade val="50000"/>
+            </a:schemeClr>
+          </a:lnRef>
+          <a:fillRef idx="1">
+            <a:schemeClr val="accent1"/>
+          </a:fillRef>
+          <a:effectRef idx="0">
+            <a:schemeClr val="accent1"/>
+          </a:effectRef>
+          <a:fontRef idx="minor">
+            <a:schemeClr val="lt1"/>
+          </a:fontRef>
+        </p:style>
+        <p:txBody>
+          <a:bodyPr vert="vert270" lIns="252000" tIns="0" rIns="0" bIns="0" rtlCol="0" anchor="t" anchorCtr="0"/>
+          <a:lstStyle/>
+          <a:p>
+            <a:pPr algn="ctr"/>
+            <a:r>
+              <a:rPr lang="fr-FR" sz="2800" b="1" cap="small" dirty="0" smtClean="0">
+                <a:solidFill>
+                  <a:schemeClr val="bg1"/>
+                </a:solidFill>
+              </a:rPr>
+              <a:t>Exemple De Visuels</a:t>
+            </a:r>
+          </a:p>
+        </p:txBody>
+      </p:sp>
+      <p:sp>
+        <p:nvSpPr>
+          <p:cNvPr id="48" name="Rectangle 47"/>
+          <p:cNvSpPr/>
+          <p:nvPr/>
+        </p:nvSpPr>
+        <p:spPr>
+          <a:xfrm>
+            <a:off x="2411760" y="116632"/>
+            <a:ext cx="4392488" cy="6552728"/>
+          </a:xfrm>
+          <a:prstGeom prst="rect">
+            <a:avLst/>
+          </a:prstGeom>
+          <a:solidFill>
+            <a:schemeClr val="bg1">
+              <a:lumMod val="75000"/>
+              <a:alpha val="74000"/>
+            </a:schemeClr>
+          </a:solidFill>
+          <a:ln>
+            <a:noFill/>
+          </a:ln>
+        </p:spPr>
+        <p:style>
+          <a:lnRef idx="2">
+            <a:schemeClr val="accent1">
+              <a:shade val="50000"/>
+            </a:schemeClr>
+          </a:lnRef>
+          <a:fillRef idx="1">
+            <a:schemeClr val="accent1"/>
+          </a:fillRef>
+          <a:effectRef idx="0">
+            <a:schemeClr val="accent1"/>
+          </a:effectRef>
+          <a:fontRef idx="minor">
+            <a:schemeClr val="lt1"/>
+          </a:fontRef>
+        </p:style>
+        <p:txBody>
+          <a:bodyPr vert="horz" lIns="36000" tIns="0" bIns="0" rtlCol="0" anchor="t" anchorCtr="0"/>
+          <a:lstStyle/>
+          <a:p>
+            <a:pPr algn="ctr"/>
+            <a:r>
+              <a:rPr lang="fr-FR" sz="2800" b="1" dirty="0" smtClean="0">
+                <a:solidFill>
+                  <a:schemeClr val="tx1"/>
+                </a:solidFill>
+              </a:rPr>
               <a:t>VIEW – 1 </a:t>
             </a:r>
+          </a:p>
+          <a:p>
+            <a:pPr algn="ctr"/>
+            <a:r>
+              <a:rPr lang="fr-FR" sz="1500" b="1" dirty="0" smtClean="0">
+                <a:solidFill>
+                  <a:schemeClr val="tx1"/>
+                </a:solidFill>
+              </a:rPr>
+              <a:t>Déclenchement rapide d’Alerte (Secouement du téléphone, double-click du bouton Home, etc.)</a:t>
+            </a:r>
+            <a:endParaRPr lang="fr-FR" sz="1500" b="1" dirty="0">
+              <a:solidFill>
+                <a:schemeClr val="tx1"/>
+              </a:solidFill>
+            </a:endParaRPr>
+          </a:p>
+        </p:txBody>
+      </p:sp>
+      <p:pic>
+        <p:nvPicPr>
+          <p:cNvPr id="2050" name="Picture 2"/>
+          <p:cNvPicPr>
+            <a:picLocks noChangeAspect="1" noChangeArrowheads="1"/>
+          </p:cNvPicPr>
+          <p:nvPr/>
+        </p:nvPicPr>
+        <p:blipFill>
+          <a:blip r:embed="rId3" cstate="print"/>
+          <a:srcRect/>
+          <a:stretch>
+            <a:fillRect/>
+          </a:stretch>
+        </p:blipFill>
+        <p:spPr bwMode="auto">
+          <a:xfrm>
+            <a:off x="3627384" y="2780928"/>
+            <a:ext cx="1592688" cy="3240360"/>
+          </a:xfrm>
+          <a:prstGeom prst="rect">
+            <a:avLst/>
+          </a:prstGeom>
+          <a:noFill/>
+          <a:ln w="9525">
+            <a:noFill/>
+            <a:miter lim="800000"/>
+            <a:headEnd/>
+            <a:tailEnd/>
+          </a:ln>
+          <a:effectLst/>
+        </p:spPr>
+      </p:pic>
+      <p:sp>
+        <p:nvSpPr>
+          <p:cNvPr id="23" name="Carré corné 22"/>
+          <p:cNvSpPr/>
+          <p:nvPr/>
+        </p:nvSpPr>
+        <p:spPr>
+          <a:xfrm>
+            <a:off x="3707904" y="1412776"/>
+            <a:ext cx="1440160" cy="576064"/>
+          </a:xfrm>
+          <a:prstGeom prst="foldedCorner">
+            <a:avLst/>
+          </a:prstGeom>
+          <a:solidFill>
+            <a:schemeClr val="accent5">
+              <a:lumMod val="40000"/>
+              <a:lumOff val="60000"/>
+            </a:schemeClr>
+          </a:solidFill>
+          <a:ln>
+            <a:solidFill>
+              <a:schemeClr val="accent5">
+                <a:lumMod val="75000"/>
+              </a:schemeClr>
+            </a:solidFill>
+          </a:ln>
+        </p:spPr>
+        <p:style>
+          <a:lnRef idx="2">
+            <a:schemeClr val="accent1">
+              <a:shade val="50000"/>
+            </a:schemeClr>
+          </a:lnRef>
+          <a:fillRef idx="1">
+            <a:schemeClr val="accent1"/>
+          </a:fillRef>
+          <a:effectRef idx="0">
+            <a:schemeClr val="accent1"/>
+          </a:effectRef>
+          <a:fontRef idx="minor">
+            <a:schemeClr val="lt1"/>
+          </a:fontRef>
+        </p:style>
+        <p:txBody>
+          <a:bodyPr rtlCol="0" anchor="ctr"/>
+          <a:lstStyle/>
+          <a:p>
+            <a:pPr algn="ctr"/>
+            <a:r>
+              <a:rPr lang="fr-FR" sz="1300" dirty="0" smtClean="0">
+                <a:solidFill>
+                  <a:schemeClr val="tx1"/>
+                </a:solidFill>
+              </a:rPr>
+              <a:t>PopUp </a:t>
+            </a:r>
+          </a:p>
+          <a:p>
+            <a:pPr algn="ctr"/>
+            <a:r>
+              <a:rPr lang="fr-FR" sz="1300" dirty="0" smtClean="0">
+                <a:solidFill>
+                  <a:schemeClr val="tx1"/>
+                </a:solidFill>
+              </a:rPr>
+              <a:t>Affichage Icones</a:t>
+            </a:r>
+            <a:endParaRPr lang="fr-FR" sz="1300" dirty="0" smtClean="0">
+              <a:solidFill>
+                <a:srgbClr val="FF0000"/>
+              </a:solidFill>
+            </a:endParaRPr>
+          </a:p>
+        </p:txBody>
+      </p:sp>
+      <p:cxnSp>
+        <p:nvCxnSpPr>
+          <p:cNvPr id="24" name="Connecteur droit avec flèche 23"/>
+          <p:cNvCxnSpPr>
+            <a:stCxn id="23" idx="2"/>
+            <a:endCxn id="2050" idx="0"/>
+          </p:cNvCxnSpPr>
+          <p:nvPr/>
+        </p:nvCxnSpPr>
+        <p:spPr>
+          <a:xfrm flipH="1">
+            <a:off x="4423728" y="1988840"/>
+            <a:ext cx="4256" cy="792088"/>
+          </a:xfrm>
+          <a:prstGeom prst="straightConnector1">
+            <a:avLst/>
+          </a:prstGeom>
+          <a:ln>
+            <a:tailEnd type="arrow"/>
+          </a:ln>
+        </p:spPr>
+        <p:style>
+          <a:lnRef idx="1">
+            <a:schemeClr val="accent1"/>
+          </a:lnRef>
+          <a:fillRef idx="0">
+            <a:schemeClr val="accent1"/>
+          </a:fillRef>
+          <a:effectRef idx="0">
+            <a:schemeClr val="accent1"/>
+          </a:effectRef>
+          <a:fontRef idx="minor">
+            <a:schemeClr val="tx1"/>
+          </a:fontRef>
+        </p:style>
+      </p:cxnSp>
+    </p:spTree>
+  </p:cSld>
+  <p:clrMapOvr>
+    <a:masterClrMapping/>
+  </p:clrMapOvr>
+  <p:timing>
+    <p:tnLst>
+      <p:par>
+        <p:cTn id="1" dur="indefinite" restart="never" nodeType="tmRoot"/>
+      </p:par>
+    </p:tnLst>
+  </p:timing>
+</p:sld>
+</file>
+
+<file path=ppt/slides/slide9.xml><?xml version="1.0" encoding="utf-8"?>
+<p:sld xmlns:a="http://schemas.openxmlformats.org/drawingml/2006/main" xmlns:r="http://schemas.openxmlformats.org/officeDocument/2006/relationships" xmlns:p="http://schemas.openxmlformats.org/presentationml/2006/main">
+  <p:cSld>
+    <p:spTree>
+      <p:nvGrpSpPr>
+        <p:cNvPr id="1" name=""/>
+        <p:cNvGrpSpPr/>
+        <p:nvPr/>
+      </p:nvGrpSpPr>
+      <p:grpSpPr>
+        <a:xfrm>
+          <a:off x="0" y="0"/>
+          <a:ext cx="0" cy="0"/>
+          <a:chOff x="0" y="0"/>
+          <a:chExt cx="0" cy="0"/>
+        </a:xfrm>
+      </p:grpSpPr>
+      <p:sp>
+        <p:nvSpPr>
+          <p:cNvPr id="158" name="Rectangle 157"/>
+          <p:cNvSpPr/>
+          <p:nvPr/>
+        </p:nvSpPr>
+        <p:spPr>
+          <a:xfrm>
+            <a:off x="-36512" y="0"/>
+            <a:ext cx="899592" cy="6858000"/>
+          </a:xfrm>
+          <a:prstGeom prst="rect">
+            <a:avLst/>
+          </a:prstGeom>
+          <a:solidFill>
+            <a:schemeClr val="accent1">
+              <a:lumMod val="50000"/>
+            </a:schemeClr>
+          </a:solidFill>
+          <a:ln>
+            <a:noFill/>
+          </a:ln>
+        </p:spPr>
+        <p:style>
+          <a:lnRef idx="2">
+            <a:schemeClr val="accent1">
+              <a:shade val="50000"/>
+            </a:schemeClr>
+          </a:lnRef>
+          <a:fillRef idx="1">
+            <a:schemeClr val="accent1"/>
+          </a:fillRef>
+          <a:effectRef idx="0">
+            <a:schemeClr val="accent1"/>
+          </a:effectRef>
+          <a:fontRef idx="minor">
+            <a:schemeClr val="lt1"/>
+          </a:fontRef>
+        </p:style>
+        <p:txBody>
+          <a:bodyPr vert="vert270" lIns="252000" tIns="0" rIns="0" bIns="0" rtlCol="0" anchor="t" anchorCtr="0"/>
+          <a:lstStyle/>
+          <a:p>
+            <a:pPr algn="ctr"/>
+            <a:r>
+              <a:rPr lang="fr-FR" sz="2800" b="1" cap="small" dirty="0" smtClean="0">
+                <a:solidFill>
+                  <a:schemeClr val="bg1"/>
+                </a:solidFill>
+              </a:rPr>
+              <a:t>Propositions De Modifications</a:t>
+            </a:r>
+          </a:p>
+        </p:txBody>
+      </p:sp>
+      <p:sp>
+        <p:nvSpPr>
+          <p:cNvPr id="48" name="Rectangle 47"/>
+          <p:cNvSpPr/>
+          <p:nvPr/>
+        </p:nvSpPr>
+        <p:spPr>
+          <a:xfrm>
+            <a:off x="1115616" y="116632"/>
+            <a:ext cx="7848872" cy="6552728"/>
+          </a:xfrm>
+          <a:prstGeom prst="rect">
+            <a:avLst/>
+          </a:prstGeom>
+          <a:solidFill>
+            <a:schemeClr val="bg1">
+              <a:lumMod val="75000"/>
+              <a:alpha val="74000"/>
+            </a:schemeClr>
+          </a:solidFill>
+          <a:ln>
+            <a:noFill/>
+          </a:ln>
+        </p:spPr>
+        <p:style>
+          <a:lnRef idx="2">
+            <a:schemeClr val="accent1">
+              <a:shade val="50000"/>
+            </a:schemeClr>
+          </a:lnRef>
+          <a:fillRef idx="1">
+            <a:schemeClr val="accent1"/>
+          </a:fillRef>
+          <a:effectRef idx="0">
+            <a:schemeClr val="accent1"/>
+          </a:effectRef>
+          <a:fontRef idx="minor">
+            <a:schemeClr val="lt1"/>
+          </a:fontRef>
+        </p:style>
+        <p:txBody>
+          <a:bodyPr vert="horz" lIns="36000" tIns="0" bIns="0" rtlCol="0" anchor="t" anchorCtr="0"/>
+          <a:lstStyle/>
+          <a:p>
+            <a:pPr algn="ctr"/>
+            <a:r>
+              <a:rPr lang="fr-FR" sz="2800" b="1" dirty="0" smtClean="0">
+                <a:solidFill>
+                  <a:schemeClr val="tx1"/>
+                </a:solidFill>
+              </a:rPr>
+              <a:t>CHART </a:t>
+            </a:r>
+            <a:r>
+              <a:rPr lang="fr-FR" sz="2800" b="1" dirty="0" smtClean="0">
+                <a:solidFill>
+                  <a:schemeClr val="tx1"/>
+                </a:solidFill>
+              </a:rPr>
+              <a:t>– </a:t>
+            </a:r>
+            <a:r>
+              <a:rPr lang="fr-FR" sz="2800" b="1" dirty="0" smtClean="0">
+                <a:solidFill>
+                  <a:schemeClr val="tx1"/>
+                </a:solidFill>
+              </a:rPr>
+              <a:t>1</a:t>
+            </a:r>
+            <a:endParaRPr lang="fr-FR" sz="2800" b="1" dirty="0" smtClean="0">
+              <a:solidFill>
+                <a:schemeClr val="tx1"/>
+              </a:solidFill>
+            </a:endParaRPr>
           </a:p>
           <a:p>
             <a:pPr algn="ctr"/>

</xml_diff>

<commit_message>
j'ai ajouté les fichiers de la maquette. En principe on a un visuel d'une trentaine de pages
</commit_message>
<xml_diff>
--- a/useCase_ppt.pptx
+++ b/useCase_ppt.pptx
@@ -5,7 +5,7 @@
     <p:sldMasterId id="2147483648" r:id="rId1"/>
   </p:sldMasterIdLst>
   <p:notesMasterIdLst>
-    <p:notesMasterId r:id="rId11"/>
+    <p:notesMasterId r:id="rId12"/>
   </p:notesMasterIdLst>
   <p:sldIdLst>
     <p:sldId id="256" r:id="rId2"/>
@@ -17,6 +17,7 @@
     <p:sldId id="266" r:id="rId8"/>
     <p:sldId id="261" r:id="rId9"/>
     <p:sldId id="262" r:id="rId10"/>
+    <p:sldId id="267" r:id="rId11"/>
   </p:sldIdLst>
   <p:sldSz cx="9144000" cy="6858000" type="screen4x3"/>
   <p:notesSz cx="6858000" cy="9144000"/>
@@ -201,7 +202,7 @@
             <a:fld id="{2F10F2CC-E386-4983-90C0-D73DD7D6C160}" type="datetimeFigureOut">
               <a:rPr lang="fr-FR" smtClean="0"/>
               <a:pPr/>
-              <a:t>02/08/2018</a:t>
+              <a:t>31/08/2018</a:t>
             </a:fld>
             <a:endParaRPr lang="fr-FR"/>
           </a:p>
@@ -1387,7 +1388,7 @@
             <a:fld id="{FE158ADE-8714-4F5E-A38B-205E88FD131D}" type="datetimeFigureOut">
               <a:rPr lang="fr-FR" smtClean="0"/>
               <a:pPr/>
-              <a:t>02/08/2018</a:t>
+              <a:t>31/08/2018</a:t>
             </a:fld>
             <a:endParaRPr lang="fr-FR"/>
           </a:p>
@@ -1554,7 +1555,7 @@
             <a:fld id="{FE158ADE-8714-4F5E-A38B-205E88FD131D}" type="datetimeFigureOut">
               <a:rPr lang="fr-FR" smtClean="0"/>
               <a:pPr/>
-              <a:t>02/08/2018</a:t>
+              <a:t>31/08/2018</a:t>
             </a:fld>
             <a:endParaRPr lang="fr-FR"/>
           </a:p>
@@ -1731,7 +1732,7 @@
             <a:fld id="{FE158ADE-8714-4F5E-A38B-205E88FD131D}" type="datetimeFigureOut">
               <a:rPr lang="fr-FR" smtClean="0"/>
               <a:pPr/>
-              <a:t>02/08/2018</a:t>
+              <a:t>31/08/2018</a:t>
             </a:fld>
             <a:endParaRPr lang="fr-FR"/>
           </a:p>
@@ -1898,7 +1899,7 @@
             <a:fld id="{FE158ADE-8714-4F5E-A38B-205E88FD131D}" type="datetimeFigureOut">
               <a:rPr lang="fr-FR" smtClean="0"/>
               <a:pPr/>
-              <a:t>02/08/2018</a:t>
+              <a:t>31/08/2018</a:t>
             </a:fld>
             <a:endParaRPr lang="fr-FR"/>
           </a:p>
@@ -2141,7 +2142,7 @@
             <a:fld id="{FE158ADE-8714-4F5E-A38B-205E88FD131D}" type="datetimeFigureOut">
               <a:rPr lang="fr-FR" smtClean="0"/>
               <a:pPr/>
-              <a:t>02/08/2018</a:t>
+              <a:t>31/08/2018</a:t>
             </a:fld>
             <a:endParaRPr lang="fr-FR"/>
           </a:p>
@@ -2426,7 +2427,7 @@
             <a:fld id="{FE158ADE-8714-4F5E-A38B-205E88FD131D}" type="datetimeFigureOut">
               <a:rPr lang="fr-FR" smtClean="0"/>
               <a:pPr/>
-              <a:t>02/08/2018</a:t>
+              <a:t>31/08/2018</a:t>
             </a:fld>
             <a:endParaRPr lang="fr-FR"/>
           </a:p>
@@ -2845,7 +2846,7 @@
             <a:fld id="{FE158ADE-8714-4F5E-A38B-205E88FD131D}" type="datetimeFigureOut">
               <a:rPr lang="fr-FR" smtClean="0"/>
               <a:pPr/>
-              <a:t>02/08/2018</a:t>
+              <a:t>31/08/2018</a:t>
             </a:fld>
             <a:endParaRPr lang="fr-FR"/>
           </a:p>
@@ -2960,7 +2961,7 @@
             <a:fld id="{FE158ADE-8714-4F5E-A38B-205E88FD131D}" type="datetimeFigureOut">
               <a:rPr lang="fr-FR" smtClean="0"/>
               <a:pPr/>
-              <a:t>02/08/2018</a:t>
+              <a:t>31/08/2018</a:t>
             </a:fld>
             <a:endParaRPr lang="fr-FR"/>
           </a:p>
@@ -3052,7 +3053,7 @@
             <a:fld id="{FE158ADE-8714-4F5E-A38B-205E88FD131D}" type="datetimeFigureOut">
               <a:rPr lang="fr-FR" smtClean="0"/>
               <a:pPr/>
-              <a:t>02/08/2018</a:t>
+              <a:t>31/08/2018</a:t>
             </a:fld>
             <a:endParaRPr lang="fr-FR"/>
           </a:p>
@@ -3326,7 +3327,7 @@
             <a:fld id="{FE158ADE-8714-4F5E-A38B-205E88FD131D}" type="datetimeFigureOut">
               <a:rPr lang="fr-FR" smtClean="0"/>
               <a:pPr/>
-              <a:t>02/08/2018</a:t>
+              <a:t>31/08/2018</a:t>
             </a:fld>
             <a:endParaRPr lang="fr-FR"/>
           </a:p>
@@ -3576,7 +3577,7 @@
             <a:fld id="{FE158ADE-8714-4F5E-A38B-205E88FD131D}" type="datetimeFigureOut">
               <a:rPr lang="fr-FR" smtClean="0"/>
               <a:pPr/>
-              <a:t>02/08/2018</a:t>
+              <a:t>31/08/2018</a:t>
             </a:fld>
             <a:endParaRPr lang="fr-FR"/>
           </a:p>
@@ -3791,7 +3792,7 @@
             <a:fld id="{FE158ADE-8714-4F5E-A38B-205E88FD131D}" type="datetimeFigureOut">
               <a:rPr lang="fr-FR" smtClean="0"/>
               <a:pPr/>
-              <a:t>02/08/2018</a:t>
+              <a:t>31/08/2018</a:t>
             </a:fld>
             <a:endParaRPr lang="fr-FR"/>
           </a:p>
@@ -6353,6 +6354,235 @@
 </p:sld>
 </file>
 
+<file path=ppt/slides/slide10.xml><?xml version="1.0" encoding="utf-8"?>
+<p:sld xmlns:a="http://schemas.openxmlformats.org/drawingml/2006/main" xmlns:r="http://schemas.openxmlformats.org/officeDocument/2006/relationships" xmlns:p="http://schemas.openxmlformats.org/presentationml/2006/main">
+  <p:cSld>
+    <p:spTree>
+      <p:nvGrpSpPr>
+        <p:cNvPr id="1" name=""/>
+        <p:cNvGrpSpPr/>
+        <p:nvPr/>
+      </p:nvGrpSpPr>
+      <p:grpSpPr>
+        <a:xfrm>
+          <a:off x="0" y="0"/>
+          <a:ext cx="0" cy="0"/>
+          <a:chOff x="0" y="0"/>
+          <a:chExt cx="0" cy="0"/>
+        </a:xfrm>
+      </p:grpSpPr>
+      <p:pic>
+        <p:nvPicPr>
+          <p:cNvPr id="1027" name="Picture 3"/>
+          <p:cNvPicPr>
+            <a:picLocks noChangeAspect="1" noChangeArrowheads="1"/>
+          </p:cNvPicPr>
+          <p:nvPr/>
+        </p:nvPicPr>
+        <p:blipFill>
+          <a:blip r:embed="rId2" cstate="print"/>
+          <a:srcRect/>
+          <a:stretch>
+            <a:fillRect/>
+          </a:stretch>
+        </p:blipFill>
+        <p:spPr bwMode="auto">
+          <a:xfrm>
+            <a:off x="2915816" y="692696"/>
+            <a:ext cx="2679700" cy="5359400"/>
+          </a:xfrm>
+          <a:prstGeom prst="rect">
+            <a:avLst/>
+          </a:prstGeom>
+          <a:noFill/>
+          <a:ln w="9525">
+            <a:noFill/>
+            <a:miter lim="800000"/>
+            <a:headEnd/>
+            <a:tailEnd/>
+          </a:ln>
+        </p:spPr>
+      </p:pic>
+      <p:sp>
+        <p:nvSpPr>
+          <p:cNvPr id="5" name="ZoneTexte 4"/>
+          <p:cNvSpPr txBox="1"/>
+          <p:nvPr/>
+        </p:nvSpPr>
+        <p:spPr>
+          <a:xfrm>
+            <a:off x="3275856" y="2863969"/>
+            <a:ext cx="864096" cy="276999"/>
+          </a:xfrm>
+          <a:prstGeom prst="rect">
+            <a:avLst/>
+          </a:prstGeom>
+          <a:noFill/>
+        </p:spPr>
+        <p:txBody>
+          <a:bodyPr wrap="square" rtlCol="0">
+            <a:spAutoFit/>
+          </a:bodyPr>
+          <a:lstStyle/>
+          <a:p>
+            <a:r>
+              <a:rPr lang="fr-FR" sz="1200" b="1" dirty="0" smtClean="0">
+                <a:solidFill>
+                  <a:srgbClr val="DA0000"/>
+                </a:solidFill>
+                <a:latin typeface="Arial" pitchFamily="34" charset="0"/>
+                <a:cs typeface="Arial" pitchFamily="34" charset="0"/>
+              </a:rPr>
+              <a:t>Incendie</a:t>
+            </a:r>
+            <a:endParaRPr lang="fr-FR" sz="1200" b="1" dirty="0">
+              <a:solidFill>
+                <a:srgbClr val="DA0000"/>
+              </a:solidFill>
+              <a:latin typeface="Arial" pitchFamily="34" charset="0"/>
+              <a:cs typeface="Arial" pitchFamily="34" charset="0"/>
+            </a:endParaRPr>
+          </a:p>
+        </p:txBody>
+      </p:sp>
+      <p:sp>
+        <p:nvSpPr>
+          <p:cNvPr id="6" name="ZoneTexte 5"/>
+          <p:cNvSpPr txBox="1"/>
+          <p:nvPr/>
+        </p:nvSpPr>
+        <p:spPr>
+          <a:xfrm>
+            <a:off x="4427984" y="4077072"/>
+            <a:ext cx="864096" cy="276999"/>
+          </a:xfrm>
+          <a:prstGeom prst="rect">
+            <a:avLst/>
+          </a:prstGeom>
+          <a:noFill/>
+        </p:spPr>
+        <p:txBody>
+          <a:bodyPr wrap="square" rtlCol="0">
+            <a:spAutoFit/>
+          </a:bodyPr>
+          <a:lstStyle/>
+          <a:p>
+            <a:r>
+              <a:rPr lang="fr-FR" sz="1200" b="1" dirty="0" smtClean="0">
+                <a:solidFill>
+                  <a:schemeClr val="accent6">
+                    <a:lumMod val="75000"/>
+                  </a:schemeClr>
+                </a:solidFill>
+                <a:latin typeface="Arial" pitchFamily="34" charset="0"/>
+                <a:cs typeface="Arial" pitchFamily="34" charset="0"/>
+              </a:rPr>
+              <a:t>Accident</a:t>
+            </a:r>
+            <a:endParaRPr lang="fr-FR" sz="1200" b="1" dirty="0">
+              <a:solidFill>
+                <a:schemeClr val="accent6">
+                  <a:lumMod val="75000"/>
+                </a:schemeClr>
+              </a:solidFill>
+              <a:latin typeface="Arial" pitchFamily="34" charset="0"/>
+              <a:cs typeface="Arial" pitchFamily="34" charset="0"/>
+            </a:endParaRPr>
+          </a:p>
+        </p:txBody>
+      </p:sp>
+      <p:sp>
+        <p:nvSpPr>
+          <p:cNvPr id="8" name="ZoneTexte 7"/>
+          <p:cNvSpPr txBox="1"/>
+          <p:nvPr/>
+        </p:nvSpPr>
+        <p:spPr>
+          <a:xfrm>
+            <a:off x="4499992" y="2863969"/>
+            <a:ext cx="648072" cy="276999"/>
+          </a:xfrm>
+          <a:prstGeom prst="rect">
+            <a:avLst/>
+          </a:prstGeom>
+          <a:noFill/>
+        </p:spPr>
+        <p:txBody>
+          <a:bodyPr wrap="square" rtlCol="0">
+            <a:spAutoFit/>
+          </a:bodyPr>
+          <a:lstStyle/>
+          <a:p>
+            <a:r>
+              <a:rPr lang="fr-FR" sz="1200" b="1" dirty="0" smtClean="0">
+                <a:solidFill>
+                  <a:srgbClr val="00B050"/>
+                </a:solidFill>
+                <a:latin typeface="Arial" pitchFamily="34" charset="0"/>
+                <a:cs typeface="Arial" pitchFamily="34" charset="0"/>
+              </a:rPr>
+              <a:t>Santé</a:t>
+            </a:r>
+            <a:endParaRPr lang="fr-FR" sz="1200" b="1" dirty="0">
+              <a:solidFill>
+                <a:srgbClr val="00B050"/>
+              </a:solidFill>
+              <a:latin typeface="Arial" pitchFamily="34" charset="0"/>
+              <a:cs typeface="Arial" pitchFamily="34" charset="0"/>
+            </a:endParaRPr>
+          </a:p>
+        </p:txBody>
+      </p:sp>
+      <p:sp>
+        <p:nvSpPr>
+          <p:cNvPr id="9" name="ZoneTexte 8"/>
+          <p:cNvSpPr txBox="1"/>
+          <p:nvPr/>
+        </p:nvSpPr>
+        <p:spPr>
+          <a:xfrm>
+            <a:off x="3347864" y="4077072"/>
+            <a:ext cx="720080" cy="276999"/>
+          </a:xfrm>
+          <a:prstGeom prst="rect">
+            <a:avLst/>
+          </a:prstGeom>
+          <a:noFill/>
+        </p:spPr>
+        <p:txBody>
+          <a:bodyPr wrap="square" rtlCol="0">
+            <a:spAutoFit/>
+          </a:bodyPr>
+          <a:lstStyle/>
+          <a:p>
+            <a:r>
+              <a:rPr lang="fr-FR" sz="1200" b="1" dirty="0" smtClean="0">
+                <a:solidFill>
+                  <a:srgbClr val="0602AA"/>
+                </a:solidFill>
+                <a:latin typeface="Arial" pitchFamily="34" charset="0"/>
+                <a:cs typeface="Arial" pitchFamily="34" charset="0"/>
+              </a:rPr>
+              <a:t>Police</a:t>
+            </a:r>
+            <a:endParaRPr lang="fr-FR" sz="1200" b="1" dirty="0">
+              <a:solidFill>
+                <a:srgbClr val="0602AA"/>
+              </a:solidFill>
+              <a:latin typeface="Arial" pitchFamily="34" charset="0"/>
+              <a:cs typeface="Arial" pitchFamily="34" charset="0"/>
+            </a:endParaRPr>
+          </a:p>
+        </p:txBody>
+      </p:sp>
+    </p:spTree>
+  </p:cSld>
+  <p:clrMapOvr>
+    <a:masterClrMapping/>
+  </p:clrMapOvr>
+</p:sld>
+</file>
+
 <file path=ppt/slides/slide2.xml><?xml version="1.0" encoding="utf-8"?>
 <p:sld xmlns:a="http://schemas.openxmlformats.org/drawingml/2006/main" xmlns:r="http://schemas.openxmlformats.org/officeDocument/2006/relationships" xmlns:p="http://schemas.openxmlformats.org/presentationml/2006/main">
   <p:cSld>
@@ -9547,11 +9777,6 @@
               </a:rPr>
               <a:t>Appel/SMS</a:t>
             </a:r>
-            <a:endParaRPr lang="fr-FR" sz="1300" dirty="0" smtClean="0">
-              <a:solidFill>
-                <a:schemeClr val="tx1"/>
-              </a:solidFill>
-            </a:endParaRPr>
           </a:p>
           <a:p>
             <a:pPr algn="ctr"/>
@@ -10813,11 +11038,6 @@
               </a:rPr>
               <a:t>Le BackLog</a:t>
             </a:r>
-            <a:endParaRPr lang="fr-FR" sz="2800" b="1" cap="small" dirty="0" smtClean="0">
-              <a:solidFill>
-                <a:schemeClr val="bg1"/>
-              </a:solidFill>
-            </a:endParaRPr>
           </a:p>
         </p:txBody>
       </p:sp>
@@ -10872,15 +11092,7 @@
                   <a:schemeClr val="tx1"/>
                 </a:solidFill>
               </a:rPr>
-              <a:t>CHART </a:t>
-            </a:r>
-            <a:r>
-              <a:rPr lang="fr-FR" sz="2800" b="1" dirty="0" smtClean="0">
-                <a:solidFill>
-                  <a:schemeClr val="tx1"/>
-                </a:solidFill>
-              </a:rPr>
-              <a:t>– 1 </a:t>
+              <a:t>CHART – 1 </a:t>
             </a:r>
           </a:p>
           <a:p>
@@ -11773,11 +11985,6 @@
               </a:rPr>
               <a:t>Le BackLog</a:t>
             </a:r>
-            <a:endParaRPr lang="fr-FR" sz="2800" b="1" cap="small" dirty="0" smtClean="0">
-              <a:solidFill>
-                <a:schemeClr val="bg1"/>
-              </a:solidFill>
-            </a:endParaRPr>
           </a:p>
         </p:txBody>
       </p:sp>
@@ -11840,15 +12047,7 @@
                   <a:schemeClr val="tx1"/>
                 </a:solidFill>
               </a:rPr>
-              <a:t>– </a:t>
-            </a:r>
-            <a:r>
-              <a:rPr lang="fr-FR" sz="2800" b="1" smtClean="0">
-                <a:solidFill>
-                  <a:schemeClr val="tx1"/>
-                </a:solidFill>
-              </a:rPr>
-              <a:t>2 </a:t>
+              <a:t>– 2 </a:t>
             </a:r>
             <a:endParaRPr lang="fr-FR" sz="2800" b="1" dirty="0" smtClean="0">
               <a:solidFill>
@@ -12114,19 +12313,11 @@
                       </a:pPr>
                       <a:r>
                         <a:rPr lang="fr-FR" sz="1200" dirty="0" smtClean="0"/>
-                        <a:t>Envoyer une alerte aux PAC </a:t>
-                      </a:r>
-                      <a:r>
-                        <a:rPr lang="fr-FR" sz="1200" dirty="0" smtClean="0"/>
-                        <a:t> définis (User</a:t>
+                        <a:t>Envoyer une alerte aux PAC  définis (User</a:t>
                       </a:r>
                       <a:r>
                         <a:rPr lang="fr-FR" sz="1200" baseline="0" dirty="0" smtClean="0"/>
-                        <a:t> offline</a:t>
-                      </a:r>
-                      <a:r>
-                        <a:rPr lang="fr-FR" sz="1200" baseline="0" dirty="0" smtClean="0"/>
-                        <a:t>)</a:t>
+                        <a:t> offline)</a:t>
                       </a:r>
                       <a:endParaRPr lang="fr-FR" sz="1200" dirty="0" smtClean="0"/>
                     </a:p>
@@ -13045,29 +13236,8 @@
                   <a:schemeClr val="tx1"/>
                 </a:solidFill>
               </a:rPr>
-              <a:t>CHART </a:t>
-            </a:r>
-            <a:r>
-              <a:rPr lang="fr-FR" sz="2800" b="1" dirty="0" smtClean="0">
-                <a:solidFill>
-                  <a:schemeClr val="tx1"/>
-                </a:solidFill>
-              </a:rPr>
-              <a:t>– </a:t>
-            </a:r>
-            <a:r>
-              <a:rPr lang="fr-FR" sz="2800" b="1" dirty="0" smtClean="0">
-                <a:solidFill>
-                  <a:schemeClr val="tx1"/>
-                </a:solidFill>
-              </a:rPr>
-              <a:t>1</a:t>
-            </a:r>
-            <a:endParaRPr lang="fr-FR" sz="2800" b="1" dirty="0" smtClean="0">
-              <a:solidFill>
-                <a:schemeClr val="tx1"/>
-              </a:solidFill>
-            </a:endParaRPr>
+              <a:t>CHART – 1</a:t>
+            </a:r>
           </a:p>
           <a:p>
             <a:pPr algn="ctr"/>

</xml_diff>